<commit_message>
Modify violinPlot to output temporary files to temporary directory and to keep quartile coloring consistent across all plots.  Update presentation with real-world example.
</commit_message>
<xml_diff>
--- a/doc/Presentation.pptx
+++ b/doc/Presentation.pptx
@@ -5,33 +5,34 @@
     <p:sldMasterId id="2147483910" r:id="rId4"/>
   </p:sldMasterIdLst>
   <p:notesMasterIdLst>
-    <p:notesMasterId r:id="rId26"/>
+    <p:notesMasterId r:id="rId27"/>
   </p:notesMasterIdLst>
   <p:handoutMasterIdLst>
-    <p:handoutMasterId r:id="rId27"/>
+    <p:handoutMasterId r:id="rId28"/>
   </p:handoutMasterIdLst>
   <p:sldIdLst>
     <p:sldId id="379" r:id="rId5"/>
     <p:sldId id="381" r:id="rId6"/>
-    <p:sldId id="382" r:id="rId7"/>
-    <p:sldId id="389" r:id="rId8"/>
-    <p:sldId id="383" r:id="rId9"/>
-    <p:sldId id="384" r:id="rId10"/>
-    <p:sldId id="400" r:id="rId11"/>
-    <p:sldId id="390" r:id="rId12"/>
-    <p:sldId id="385" r:id="rId13"/>
-    <p:sldId id="386" r:id="rId14"/>
-    <p:sldId id="391" r:id="rId15"/>
-    <p:sldId id="388" r:id="rId16"/>
-    <p:sldId id="392" r:id="rId17"/>
-    <p:sldId id="393" r:id="rId18"/>
-    <p:sldId id="394" r:id="rId19"/>
-    <p:sldId id="401" r:id="rId20"/>
-    <p:sldId id="396" r:id="rId21"/>
-    <p:sldId id="397" r:id="rId22"/>
-    <p:sldId id="398" r:id="rId23"/>
-    <p:sldId id="399" r:id="rId24"/>
-    <p:sldId id="402" r:id="rId25"/>
+    <p:sldId id="403" r:id="rId7"/>
+    <p:sldId id="382" r:id="rId8"/>
+    <p:sldId id="389" r:id="rId9"/>
+    <p:sldId id="383" r:id="rId10"/>
+    <p:sldId id="384" r:id="rId11"/>
+    <p:sldId id="400" r:id="rId12"/>
+    <p:sldId id="390" r:id="rId13"/>
+    <p:sldId id="385" r:id="rId14"/>
+    <p:sldId id="386" r:id="rId15"/>
+    <p:sldId id="391" r:id="rId16"/>
+    <p:sldId id="388" r:id="rId17"/>
+    <p:sldId id="392" r:id="rId18"/>
+    <p:sldId id="393" r:id="rId19"/>
+    <p:sldId id="394" r:id="rId20"/>
+    <p:sldId id="401" r:id="rId21"/>
+    <p:sldId id="396" r:id="rId22"/>
+    <p:sldId id="397" r:id="rId23"/>
+    <p:sldId id="398" r:id="rId24"/>
+    <p:sldId id="399" r:id="rId25"/>
+    <p:sldId id="402" r:id="rId26"/>
   </p:sldIdLst>
   <p:sldSz cx="9144000" cy="6858000" type="screen4x3"/>
   <p:notesSz cx="6858000" cy="9144000"/>
@@ -260,7 +261,7 @@
               <a:pPr>
                 <a:defRPr/>
               </a:pPr>
-              <a:t>4/26/2016</a:t>
+              <a:t>4/27/2016</a:t>
             </a:fld>
             <a:endParaRPr lang="en-US" dirty="0"/>
           </a:p>
@@ -470,7 +471,7 @@
               <a:pPr>
                 <a:defRPr/>
               </a:pPr>
-              <a:t>4/26/2016</a:t>
+              <a:t>4/27/2016</a:t>
             </a:fld>
             <a:endParaRPr lang="en-US" dirty="0"/>
           </a:p>
@@ -1112,7 +1113,7 @@
               <a:pPr>
                 <a:defRPr/>
               </a:pPr>
-              <a:t>4/26/2016</a:t>
+              <a:t>4/27/2016</a:t>
             </a:fld>
             <a:endParaRPr lang="en-US" dirty="0"/>
           </a:p>
@@ -1306,7 +1307,7 @@
               <a:pPr>
                 <a:defRPr/>
               </a:pPr>
-              <a:t>4/26/2016</a:t>
+              <a:t>4/27/2016</a:t>
             </a:fld>
             <a:endParaRPr lang="en-US" dirty="0"/>
           </a:p>
@@ -1552,7 +1553,7 @@
               <a:pPr>
                 <a:defRPr/>
               </a:pPr>
-              <a:t>4/26/2016</a:t>
+              <a:t>4/27/2016</a:t>
             </a:fld>
             <a:endParaRPr lang="en-US" dirty="0"/>
           </a:p>
@@ -1788,7 +1789,7 @@
               <a:pPr>
                 <a:defRPr/>
               </a:pPr>
-              <a:t>4/26/2016</a:t>
+              <a:t>4/27/2016</a:t>
             </a:fld>
             <a:endParaRPr lang="en-US" dirty="0"/>
           </a:p>
@@ -2101,7 +2102,7 @@
               <a:pPr>
                 <a:defRPr/>
               </a:pPr>
-              <a:t>4/26/2016</a:t>
+              <a:t>4/27/2016</a:t>
             </a:fld>
             <a:endParaRPr lang="en-US" dirty="0"/>
           </a:p>
@@ -2436,7 +2437,7 @@
               <a:pPr>
                 <a:defRPr/>
               </a:pPr>
-              <a:t>4/26/2016</a:t>
+              <a:t>4/27/2016</a:t>
             </a:fld>
             <a:endParaRPr lang="en-US" dirty="0"/>
           </a:p>
@@ -2885,7 +2886,7 @@
               <a:pPr>
                 <a:defRPr/>
               </a:pPr>
-              <a:t>4/26/2016</a:t>
+              <a:t>4/27/2016</a:t>
             </a:fld>
             <a:endParaRPr lang="en-US" dirty="0"/>
           </a:p>
@@ -3060,7 +3061,7 @@
               <a:pPr>
                 <a:defRPr/>
               </a:pPr>
-              <a:t>4/26/2016</a:t>
+              <a:t>4/27/2016</a:t>
             </a:fld>
             <a:endParaRPr lang="en-US" dirty="0"/>
           </a:p>
@@ -3221,7 +3222,7 @@
               <a:pPr>
                 <a:defRPr/>
               </a:pPr>
-              <a:t>4/26/2016</a:t>
+              <a:t>4/27/2016</a:t>
             </a:fld>
             <a:endParaRPr lang="en-US" dirty="0"/>
           </a:p>
@@ -3553,7 +3554,7 @@
               <a:pPr>
                 <a:defRPr/>
               </a:pPr>
-              <a:t>4/26/2016</a:t>
+              <a:t>4/27/2016</a:t>
             </a:fld>
             <a:endParaRPr lang="en-US" dirty="0"/>
           </a:p>
@@ -3866,7 +3867,7 @@
               <a:pPr>
                 <a:defRPr/>
               </a:pPr>
-              <a:t>4/26/2016</a:t>
+              <a:t>4/27/2016</a:t>
             </a:fld>
             <a:endParaRPr lang="en-US" dirty="0"/>
           </a:p>
@@ -4676,7 +4677,7 @@
               <a:pPr>
                 <a:defRPr/>
               </a:pPr>
-              <a:t>4/26/2016</a:t>
+              <a:t>4/27/2016</a:t>
             </a:fld>
             <a:endParaRPr lang="en-US" dirty="0"/>
           </a:p>
@@ -5534,6 +5535,1056 @@
       </p:sp>
       <p:pic>
         <p:nvPicPr>
+          <p:cNvPr id="5" name="Content Placeholder 4"/>
+          <p:cNvPicPr>
+            <a:picLocks noGrp="1" noChangeAspect="1"/>
+          </p:cNvPicPr>
+          <p:nvPr>
+            <p:ph sz="half" idx="1"/>
+          </p:nvPr>
+        </p:nvPicPr>
+        <p:blipFill>
+          <a:blip r:embed="rId2" cstate="print">
+            <a:extLst>
+              <a:ext uri="{28A0092B-C50C-407E-A947-70E740481C1C}">
+                <a14:useLocalDpi xmlns:a14="http://schemas.microsoft.com/office/drawing/2010/main" val="0"/>
+              </a:ext>
+            </a:extLst>
+          </a:blip>
+          <a:stretch>
+            <a:fillRect/>
+          </a:stretch>
+        </p:blipFill>
+        <p:spPr>
+          <a:xfrm>
+            <a:off x="45987" y="2286000"/>
+            <a:ext cx="5288013" cy="4028961"/>
+          </a:xfrm>
+        </p:spPr>
+      </p:pic>
+      <p:sp>
+        <p:nvSpPr>
+          <p:cNvPr id="4" name="Content Placeholder 3"/>
+          <p:cNvSpPr>
+            <a:spLocks noGrp="1"/>
+          </p:cNvSpPr>
+          <p:nvPr>
+            <p:ph sz="half" idx="2"/>
+          </p:nvPr>
+        </p:nvSpPr>
+        <p:spPr>
+          <a:xfrm>
+            <a:off x="5257800" y="1920085"/>
+            <a:ext cx="3429000" cy="4434840"/>
+          </a:xfrm>
+        </p:spPr>
+        <p:txBody>
+          <a:bodyPr/>
+          <a:lstStyle/>
+          <a:p>
+            <a:r>
+              <a:rPr lang="en-US" dirty="0" smtClean="0"/>
+              <a:t>Range is already present</a:t>
+            </a:r>
+          </a:p>
+          <a:p>
+            <a:r>
+              <a:rPr lang="en-US" dirty="0" smtClean="0"/>
+              <a:t>What about quartiles?</a:t>
+            </a:r>
+          </a:p>
+          <a:p>
+            <a:r>
+              <a:rPr lang="en-US" dirty="0" smtClean="0"/>
+              <a:t>Not really elegant</a:t>
+            </a:r>
+          </a:p>
+          <a:p>
+            <a:r>
+              <a:rPr lang="en-US" dirty="0" smtClean="0"/>
+              <a:t>And what about the mean?</a:t>
+            </a:r>
+          </a:p>
+        </p:txBody>
+      </p:sp>
+      <p:sp>
+        <p:nvSpPr>
+          <p:cNvPr id="6" name="Right Brace 5"/>
+          <p:cNvSpPr/>
+          <p:nvPr/>
+        </p:nvSpPr>
+        <p:spPr>
+          <a:xfrm>
+            <a:off x="3048000" y="2590800"/>
+            <a:ext cx="1295400" cy="2895600"/>
+          </a:xfrm>
+          <a:prstGeom prst="rightBrace">
+            <a:avLst/>
+          </a:prstGeom>
+          <a:ln w="15875"/>
+        </p:spPr>
+        <p:style>
+          <a:lnRef idx="1">
+            <a:schemeClr val="accent1"/>
+          </a:lnRef>
+          <a:fillRef idx="0">
+            <a:schemeClr val="accent1"/>
+          </a:fillRef>
+          <a:effectRef idx="0">
+            <a:schemeClr val="accent1"/>
+          </a:effectRef>
+          <a:fontRef idx="minor">
+            <a:schemeClr val="tx1"/>
+          </a:fontRef>
+        </p:style>
+        <p:txBody>
+          <a:bodyPr rtlCol="0" anchor="ctr"/>
+          <a:lstStyle/>
+          <a:p>
+            <a:pPr algn="ctr"/>
+            <a:endParaRPr lang="en-US"/>
+          </a:p>
+        </p:txBody>
+      </p:sp>
+      <p:sp>
+        <p:nvSpPr>
+          <p:cNvPr id="7" name="TextBox 6"/>
+          <p:cNvSpPr txBox="1"/>
+          <p:nvPr/>
+        </p:nvSpPr>
+        <p:spPr>
+          <a:xfrm>
+            <a:off x="1676400" y="3853934"/>
+            <a:ext cx="533400" cy="369332"/>
+          </a:xfrm>
+          <a:prstGeom prst="rect">
+            <a:avLst/>
+          </a:prstGeom>
+          <a:noFill/>
+        </p:spPr>
+        <p:txBody>
+          <a:bodyPr wrap="square" rtlCol="0">
+            <a:spAutoFit/>
+          </a:bodyPr>
+          <a:lstStyle/>
+          <a:p>
+            <a:r>
+              <a:rPr lang="en-US" b="1" dirty="0" smtClean="0">
+                <a:solidFill>
+                  <a:schemeClr val="accent1">
+                    <a:lumMod val="50000"/>
+                  </a:schemeClr>
+                </a:solidFill>
+              </a:rPr>
+              <a:t>3</a:t>
+            </a:r>
+            <a:r>
+              <a:rPr lang="en-US" b="1" baseline="30000" dirty="0" smtClean="0">
+                <a:solidFill>
+                  <a:schemeClr val="accent1">
+                    <a:lumMod val="50000"/>
+                  </a:schemeClr>
+                </a:solidFill>
+              </a:rPr>
+              <a:t>rd</a:t>
+            </a:r>
+            <a:endParaRPr lang="en-US" b="1" dirty="0">
+              <a:solidFill>
+                <a:schemeClr val="accent1">
+                  <a:lumMod val="50000"/>
+                </a:schemeClr>
+              </a:solidFill>
+            </a:endParaRPr>
+          </a:p>
+        </p:txBody>
+      </p:sp>
+      <p:cxnSp>
+        <p:nvCxnSpPr>
+          <p:cNvPr id="9" name="Straight Arrow Connector 8"/>
+          <p:cNvCxnSpPr/>
+          <p:nvPr/>
+        </p:nvCxnSpPr>
+        <p:spPr>
+          <a:xfrm>
+            <a:off x="2209800" y="4038600"/>
+            <a:ext cx="533400" cy="228600"/>
+          </a:xfrm>
+          <a:prstGeom prst="straightConnector1">
+            <a:avLst/>
+          </a:prstGeom>
+          <a:ln w="15875">
+            <a:tailEnd type="arrow"/>
+          </a:ln>
+        </p:spPr>
+        <p:style>
+          <a:lnRef idx="1">
+            <a:schemeClr val="accent1"/>
+          </a:lnRef>
+          <a:fillRef idx="0">
+            <a:schemeClr val="accent1"/>
+          </a:fillRef>
+          <a:effectRef idx="0">
+            <a:schemeClr val="accent1"/>
+          </a:effectRef>
+          <a:fontRef idx="minor">
+            <a:schemeClr val="tx1"/>
+          </a:fontRef>
+        </p:style>
+      </p:cxnSp>
+      <p:sp>
+        <p:nvSpPr>
+          <p:cNvPr id="13" name="TextBox 12"/>
+          <p:cNvSpPr txBox="1"/>
+          <p:nvPr/>
+        </p:nvSpPr>
+        <p:spPr>
+          <a:xfrm>
+            <a:off x="1714500" y="5110639"/>
+            <a:ext cx="457200" cy="369332"/>
+          </a:xfrm>
+          <a:prstGeom prst="rect">
+            <a:avLst/>
+          </a:prstGeom>
+          <a:noFill/>
+        </p:spPr>
+        <p:txBody>
+          <a:bodyPr wrap="square" rtlCol="0">
+            <a:spAutoFit/>
+          </a:bodyPr>
+          <a:lstStyle/>
+          <a:p>
+            <a:r>
+              <a:rPr lang="en-US" b="1" dirty="0" smtClean="0">
+                <a:solidFill>
+                  <a:schemeClr val="accent1">
+                    <a:lumMod val="50000"/>
+                  </a:schemeClr>
+                </a:solidFill>
+              </a:rPr>
+              <a:t>1</a:t>
+            </a:r>
+            <a:r>
+              <a:rPr lang="en-US" b="1" baseline="30000" dirty="0" smtClean="0">
+                <a:solidFill>
+                  <a:schemeClr val="accent1">
+                    <a:lumMod val="50000"/>
+                  </a:schemeClr>
+                </a:solidFill>
+              </a:rPr>
+              <a:t>st</a:t>
+            </a:r>
+            <a:endParaRPr lang="en-US" b="1" dirty="0">
+              <a:solidFill>
+                <a:schemeClr val="accent1">
+                  <a:lumMod val="50000"/>
+                </a:schemeClr>
+              </a:solidFill>
+            </a:endParaRPr>
+          </a:p>
+        </p:txBody>
+      </p:sp>
+      <p:sp>
+        <p:nvSpPr>
+          <p:cNvPr id="14" name="TextBox 13"/>
+          <p:cNvSpPr txBox="1"/>
+          <p:nvPr/>
+        </p:nvSpPr>
+        <p:spPr>
+          <a:xfrm>
+            <a:off x="1219200" y="4419600"/>
+            <a:ext cx="1257300" cy="369332"/>
+          </a:xfrm>
+          <a:prstGeom prst="rect">
+            <a:avLst/>
+          </a:prstGeom>
+          <a:noFill/>
+        </p:spPr>
+        <p:txBody>
+          <a:bodyPr wrap="square" rtlCol="0">
+            <a:spAutoFit/>
+          </a:bodyPr>
+          <a:lstStyle/>
+          <a:p>
+            <a:r>
+              <a:rPr lang="en-US" b="1" dirty="0" smtClean="0">
+                <a:solidFill>
+                  <a:schemeClr val="accent1">
+                    <a:lumMod val="50000"/>
+                  </a:schemeClr>
+                </a:solidFill>
+              </a:rPr>
+              <a:t>Median</a:t>
+            </a:r>
+            <a:endParaRPr lang="en-US" b="1" dirty="0">
+              <a:solidFill>
+                <a:schemeClr val="accent1">
+                  <a:lumMod val="50000"/>
+                </a:schemeClr>
+              </a:solidFill>
+            </a:endParaRPr>
+          </a:p>
+        </p:txBody>
+      </p:sp>
+      <p:cxnSp>
+        <p:nvCxnSpPr>
+          <p:cNvPr id="15" name="Straight Arrow Connector 14"/>
+          <p:cNvCxnSpPr>
+            <a:stCxn id="13" idx="3"/>
+          </p:cNvCxnSpPr>
+          <p:nvPr/>
+        </p:nvCxnSpPr>
+        <p:spPr>
+          <a:xfrm flipV="1">
+            <a:off x="2171700" y="5029200"/>
+            <a:ext cx="571500" cy="266105"/>
+          </a:xfrm>
+          <a:prstGeom prst="straightConnector1">
+            <a:avLst/>
+          </a:prstGeom>
+          <a:ln w="15875">
+            <a:tailEnd type="arrow"/>
+          </a:ln>
+        </p:spPr>
+        <p:style>
+          <a:lnRef idx="1">
+            <a:schemeClr val="accent1"/>
+          </a:lnRef>
+          <a:fillRef idx="0">
+            <a:schemeClr val="accent1"/>
+          </a:fillRef>
+          <a:effectRef idx="0">
+            <a:schemeClr val="accent1"/>
+          </a:effectRef>
+          <a:fontRef idx="minor">
+            <a:schemeClr val="tx1"/>
+          </a:fontRef>
+        </p:style>
+      </p:cxnSp>
+      <p:cxnSp>
+        <p:nvCxnSpPr>
+          <p:cNvPr id="18" name="Straight Arrow Connector 17"/>
+          <p:cNvCxnSpPr/>
+          <p:nvPr/>
+        </p:nvCxnSpPr>
+        <p:spPr>
+          <a:xfrm>
+            <a:off x="2209800" y="4604266"/>
+            <a:ext cx="533400" cy="0"/>
+          </a:xfrm>
+          <a:prstGeom prst="straightConnector1">
+            <a:avLst/>
+          </a:prstGeom>
+          <a:ln w="15875">
+            <a:tailEnd type="arrow"/>
+          </a:ln>
+        </p:spPr>
+        <p:style>
+          <a:lnRef idx="1">
+            <a:schemeClr val="accent1"/>
+          </a:lnRef>
+          <a:fillRef idx="0">
+            <a:schemeClr val="accent1"/>
+          </a:fillRef>
+          <a:effectRef idx="0">
+            <a:schemeClr val="accent1"/>
+          </a:effectRef>
+          <a:fontRef idx="minor">
+            <a:schemeClr val="tx1"/>
+          </a:fontRef>
+        </p:style>
+      </p:cxnSp>
+    </p:spTree>
+    <p:extLst>
+      <p:ext uri="{BB962C8B-B14F-4D97-AF65-F5344CB8AC3E}">
+        <p14:creationId xmlns:p14="http://schemas.microsoft.com/office/powerpoint/2010/main" val="2532616962"/>
+      </p:ext>
+    </p:extLst>
+  </p:cSld>
+  <p:clrMapOvr>
+    <a:masterClrMapping/>
+  </p:clrMapOvr>
+  <p:transition spd="med">
+    <p:fade/>
+  </p:transition>
+  <p:timing>
+    <p:tnLst>
+      <p:par>
+        <p:cTn id="1" dur="indefinite" restart="never" nodeType="tmRoot">
+          <p:childTnLst>
+            <p:seq concurrent="1" nextAc="seek">
+              <p:cTn id="2" dur="indefinite" nodeType="mainSeq">
+                <p:childTnLst>
+                  <p:par>
+                    <p:cTn id="3" fill="hold">
+                      <p:stCondLst>
+                        <p:cond delay="indefinite"/>
+                      </p:stCondLst>
+                      <p:childTnLst>
+                        <p:par>
+                          <p:cTn id="4" fill="hold">
+                            <p:stCondLst>
+                              <p:cond delay="0"/>
+                            </p:stCondLst>
+                            <p:childTnLst>
+                              <p:par>
+                                <p:cTn id="5" presetID="10" presetClass="entr" presetSubtype="0" fill="hold" nodeType="clickEffect">
+                                  <p:stCondLst>
+                                    <p:cond delay="0"/>
+                                  </p:stCondLst>
+                                  <p:childTnLst>
+                                    <p:set>
+                                      <p:cBhvr>
+                                        <p:cTn id="6" dur="1" fill="hold">
+                                          <p:stCondLst>
+                                            <p:cond delay="0"/>
+                                          </p:stCondLst>
+                                        </p:cTn>
+                                        <p:tgtEl>
+                                          <p:spTgt spid="5"/>
+                                        </p:tgtEl>
+                                        <p:attrNameLst>
+                                          <p:attrName>style.visibility</p:attrName>
+                                        </p:attrNameLst>
+                                      </p:cBhvr>
+                                      <p:to>
+                                        <p:strVal val="visible"/>
+                                      </p:to>
+                                    </p:set>
+                                    <p:animEffect transition="in" filter="fade">
+                                      <p:cBhvr>
+                                        <p:cTn id="7" dur="500"/>
+                                        <p:tgtEl>
+                                          <p:spTgt spid="5"/>
+                                        </p:tgtEl>
+                                      </p:cBhvr>
+                                    </p:animEffect>
+                                  </p:childTnLst>
+                                </p:cTn>
+                              </p:par>
+                            </p:childTnLst>
+                          </p:cTn>
+                        </p:par>
+                      </p:childTnLst>
+                    </p:cTn>
+                  </p:par>
+                  <p:par>
+                    <p:cTn id="8" fill="hold">
+                      <p:stCondLst>
+                        <p:cond delay="indefinite"/>
+                      </p:stCondLst>
+                      <p:childTnLst>
+                        <p:par>
+                          <p:cTn id="9" fill="hold">
+                            <p:stCondLst>
+                              <p:cond delay="0"/>
+                            </p:stCondLst>
+                            <p:childTnLst>
+                              <p:par>
+                                <p:cTn id="10" presetID="10" presetClass="entr" presetSubtype="0" fill="hold" nodeType="clickEffect">
+                                  <p:stCondLst>
+                                    <p:cond delay="0"/>
+                                  </p:stCondLst>
+                                  <p:childTnLst>
+                                    <p:set>
+                                      <p:cBhvr>
+                                        <p:cTn id="11" dur="1" fill="hold">
+                                          <p:stCondLst>
+                                            <p:cond delay="0"/>
+                                          </p:stCondLst>
+                                        </p:cTn>
+                                        <p:tgtEl>
+                                          <p:spTgt spid="4">
+                                            <p:txEl>
+                                              <p:pRg st="0" end="0"/>
+                                            </p:txEl>
+                                          </p:spTgt>
+                                        </p:tgtEl>
+                                        <p:attrNameLst>
+                                          <p:attrName>style.visibility</p:attrName>
+                                        </p:attrNameLst>
+                                      </p:cBhvr>
+                                      <p:to>
+                                        <p:strVal val="visible"/>
+                                      </p:to>
+                                    </p:set>
+                                    <p:animEffect transition="in" filter="fade">
+                                      <p:cBhvr>
+                                        <p:cTn id="12" dur="500"/>
+                                        <p:tgtEl>
+                                          <p:spTgt spid="4">
+                                            <p:txEl>
+                                              <p:pRg st="0" end="0"/>
+                                            </p:txEl>
+                                          </p:spTgt>
+                                        </p:tgtEl>
+                                      </p:cBhvr>
+                                    </p:animEffect>
+                                  </p:childTnLst>
+                                </p:cTn>
+                              </p:par>
+                              <p:par>
+                                <p:cTn id="13" presetID="10" presetClass="entr" presetSubtype="0" fill="hold" grpId="0" nodeType="withEffect">
+                                  <p:stCondLst>
+                                    <p:cond delay="0"/>
+                                  </p:stCondLst>
+                                  <p:childTnLst>
+                                    <p:set>
+                                      <p:cBhvr>
+                                        <p:cTn id="14" dur="1" fill="hold">
+                                          <p:stCondLst>
+                                            <p:cond delay="0"/>
+                                          </p:stCondLst>
+                                        </p:cTn>
+                                        <p:tgtEl>
+                                          <p:spTgt spid="6"/>
+                                        </p:tgtEl>
+                                        <p:attrNameLst>
+                                          <p:attrName>style.visibility</p:attrName>
+                                        </p:attrNameLst>
+                                      </p:cBhvr>
+                                      <p:to>
+                                        <p:strVal val="visible"/>
+                                      </p:to>
+                                    </p:set>
+                                    <p:animEffect transition="in" filter="fade">
+                                      <p:cBhvr>
+                                        <p:cTn id="15" dur="500"/>
+                                        <p:tgtEl>
+                                          <p:spTgt spid="6"/>
+                                        </p:tgtEl>
+                                      </p:cBhvr>
+                                    </p:animEffect>
+                                  </p:childTnLst>
+                                </p:cTn>
+                              </p:par>
+                            </p:childTnLst>
+                          </p:cTn>
+                        </p:par>
+                      </p:childTnLst>
+                    </p:cTn>
+                  </p:par>
+                  <p:par>
+                    <p:cTn id="16" fill="hold">
+                      <p:stCondLst>
+                        <p:cond delay="indefinite"/>
+                      </p:stCondLst>
+                      <p:childTnLst>
+                        <p:par>
+                          <p:cTn id="17" fill="hold">
+                            <p:stCondLst>
+                              <p:cond delay="0"/>
+                            </p:stCondLst>
+                            <p:childTnLst>
+                              <p:par>
+                                <p:cTn id="18" presetID="10" presetClass="entr" presetSubtype="0" fill="hold" nodeType="clickEffect">
+                                  <p:stCondLst>
+                                    <p:cond delay="0"/>
+                                  </p:stCondLst>
+                                  <p:childTnLst>
+                                    <p:set>
+                                      <p:cBhvr>
+                                        <p:cTn id="19" dur="1" fill="hold">
+                                          <p:stCondLst>
+                                            <p:cond delay="0"/>
+                                          </p:stCondLst>
+                                        </p:cTn>
+                                        <p:tgtEl>
+                                          <p:spTgt spid="4">
+                                            <p:txEl>
+                                              <p:pRg st="1" end="1"/>
+                                            </p:txEl>
+                                          </p:spTgt>
+                                        </p:tgtEl>
+                                        <p:attrNameLst>
+                                          <p:attrName>style.visibility</p:attrName>
+                                        </p:attrNameLst>
+                                      </p:cBhvr>
+                                      <p:to>
+                                        <p:strVal val="visible"/>
+                                      </p:to>
+                                    </p:set>
+                                    <p:animEffect transition="in" filter="fade">
+                                      <p:cBhvr>
+                                        <p:cTn id="20" dur="500"/>
+                                        <p:tgtEl>
+                                          <p:spTgt spid="4">
+                                            <p:txEl>
+                                              <p:pRg st="1" end="1"/>
+                                            </p:txEl>
+                                          </p:spTgt>
+                                        </p:tgtEl>
+                                      </p:cBhvr>
+                                    </p:animEffect>
+                                  </p:childTnLst>
+                                </p:cTn>
+                              </p:par>
+                            </p:childTnLst>
+                          </p:cTn>
+                        </p:par>
+                      </p:childTnLst>
+                    </p:cTn>
+                  </p:par>
+                  <p:par>
+                    <p:cTn id="21" fill="hold">
+                      <p:stCondLst>
+                        <p:cond delay="indefinite"/>
+                      </p:stCondLst>
+                      <p:childTnLst>
+                        <p:par>
+                          <p:cTn id="22" fill="hold">
+                            <p:stCondLst>
+                              <p:cond delay="0"/>
+                            </p:stCondLst>
+                            <p:childTnLst>
+                              <p:par>
+                                <p:cTn id="23" presetID="10" presetClass="entr" presetSubtype="0" fill="hold" grpId="0" nodeType="clickEffect">
+                                  <p:stCondLst>
+                                    <p:cond delay="0"/>
+                                  </p:stCondLst>
+                                  <p:childTnLst>
+                                    <p:set>
+                                      <p:cBhvr>
+                                        <p:cTn id="24" dur="1" fill="hold">
+                                          <p:stCondLst>
+                                            <p:cond delay="0"/>
+                                          </p:stCondLst>
+                                        </p:cTn>
+                                        <p:tgtEl>
+                                          <p:spTgt spid="13"/>
+                                        </p:tgtEl>
+                                        <p:attrNameLst>
+                                          <p:attrName>style.visibility</p:attrName>
+                                        </p:attrNameLst>
+                                      </p:cBhvr>
+                                      <p:to>
+                                        <p:strVal val="visible"/>
+                                      </p:to>
+                                    </p:set>
+                                    <p:animEffect transition="in" filter="fade">
+                                      <p:cBhvr>
+                                        <p:cTn id="25" dur="500"/>
+                                        <p:tgtEl>
+                                          <p:spTgt spid="13"/>
+                                        </p:tgtEl>
+                                      </p:cBhvr>
+                                    </p:animEffect>
+                                  </p:childTnLst>
+                                </p:cTn>
+                              </p:par>
+                              <p:par>
+                                <p:cTn id="26" presetID="10" presetClass="entr" presetSubtype="0" fill="hold" nodeType="withEffect">
+                                  <p:stCondLst>
+                                    <p:cond delay="0"/>
+                                  </p:stCondLst>
+                                  <p:childTnLst>
+                                    <p:set>
+                                      <p:cBhvr>
+                                        <p:cTn id="27" dur="1" fill="hold">
+                                          <p:stCondLst>
+                                            <p:cond delay="0"/>
+                                          </p:stCondLst>
+                                        </p:cTn>
+                                        <p:tgtEl>
+                                          <p:spTgt spid="15"/>
+                                        </p:tgtEl>
+                                        <p:attrNameLst>
+                                          <p:attrName>style.visibility</p:attrName>
+                                        </p:attrNameLst>
+                                      </p:cBhvr>
+                                      <p:to>
+                                        <p:strVal val="visible"/>
+                                      </p:to>
+                                    </p:set>
+                                    <p:animEffect transition="in" filter="fade">
+                                      <p:cBhvr>
+                                        <p:cTn id="28" dur="500"/>
+                                        <p:tgtEl>
+                                          <p:spTgt spid="15"/>
+                                        </p:tgtEl>
+                                      </p:cBhvr>
+                                    </p:animEffect>
+                                  </p:childTnLst>
+                                </p:cTn>
+                              </p:par>
+                            </p:childTnLst>
+                          </p:cTn>
+                        </p:par>
+                      </p:childTnLst>
+                    </p:cTn>
+                  </p:par>
+                  <p:par>
+                    <p:cTn id="29" fill="hold">
+                      <p:stCondLst>
+                        <p:cond delay="indefinite"/>
+                      </p:stCondLst>
+                      <p:childTnLst>
+                        <p:par>
+                          <p:cTn id="30" fill="hold">
+                            <p:stCondLst>
+                              <p:cond delay="0"/>
+                            </p:stCondLst>
+                            <p:childTnLst>
+                              <p:par>
+                                <p:cTn id="31" presetID="10" presetClass="entr" presetSubtype="0" fill="hold" grpId="0" nodeType="clickEffect">
+                                  <p:stCondLst>
+                                    <p:cond delay="0"/>
+                                  </p:stCondLst>
+                                  <p:childTnLst>
+                                    <p:set>
+                                      <p:cBhvr>
+                                        <p:cTn id="32" dur="1" fill="hold">
+                                          <p:stCondLst>
+                                            <p:cond delay="0"/>
+                                          </p:stCondLst>
+                                        </p:cTn>
+                                        <p:tgtEl>
+                                          <p:spTgt spid="14"/>
+                                        </p:tgtEl>
+                                        <p:attrNameLst>
+                                          <p:attrName>style.visibility</p:attrName>
+                                        </p:attrNameLst>
+                                      </p:cBhvr>
+                                      <p:to>
+                                        <p:strVal val="visible"/>
+                                      </p:to>
+                                    </p:set>
+                                    <p:animEffect transition="in" filter="fade">
+                                      <p:cBhvr>
+                                        <p:cTn id="33" dur="500"/>
+                                        <p:tgtEl>
+                                          <p:spTgt spid="14"/>
+                                        </p:tgtEl>
+                                      </p:cBhvr>
+                                    </p:animEffect>
+                                  </p:childTnLst>
+                                </p:cTn>
+                              </p:par>
+                              <p:par>
+                                <p:cTn id="34" presetID="10" presetClass="entr" presetSubtype="0" fill="hold" nodeType="withEffect">
+                                  <p:stCondLst>
+                                    <p:cond delay="0"/>
+                                  </p:stCondLst>
+                                  <p:childTnLst>
+                                    <p:set>
+                                      <p:cBhvr>
+                                        <p:cTn id="35" dur="1" fill="hold">
+                                          <p:stCondLst>
+                                            <p:cond delay="0"/>
+                                          </p:stCondLst>
+                                        </p:cTn>
+                                        <p:tgtEl>
+                                          <p:spTgt spid="18"/>
+                                        </p:tgtEl>
+                                        <p:attrNameLst>
+                                          <p:attrName>style.visibility</p:attrName>
+                                        </p:attrNameLst>
+                                      </p:cBhvr>
+                                      <p:to>
+                                        <p:strVal val="visible"/>
+                                      </p:to>
+                                    </p:set>
+                                    <p:animEffect transition="in" filter="fade">
+                                      <p:cBhvr>
+                                        <p:cTn id="36" dur="500"/>
+                                        <p:tgtEl>
+                                          <p:spTgt spid="18"/>
+                                        </p:tgtEl>
+                                      </p:cBhvr>
+                                    </p:animEffect>
+                                  </p:childTnLst>
+                                </p:cTn>
+                              </p:par>
+                            </p:childTnLst>
+                          </p:cTn>
+                        </p:par>
+                      </p:childTnLst>
+                    </p:cTn>
+                  </p:par>
+                  <p:par>
+                    <p:cTn id="37" fill="hold">
+                      <p:stCondLst>
+                        <p:cond delay="indefinite"/>
+                      </p:stCondLst>
+                      <p:childTnLst>
+                        <p:par>
+                          <p:cTn id="38" fill="hold">
+                            <p:stCondLst>
+                              <p:cond delay="0"/>
+                            </p:stCondLst>
+                            <p:childTnLst>
+                              <p:par>
+                                <p:cTn id="39" presetID="10" presetClass="entr" presetSubtype="0" fill="hold" grpId="0" nodeType="clickEffect">
+                                  <p:stCondLst>
+                                    <p:cond delay="0"/>
+                                  </p:stCondLst>
+                                  <p:childTnLst>
+                                    <p:set>
+                                      <p:cBhvr>
+                                        <p:cTn id="40" dur="1" fill="hold">
+                                          <p:stCondLst>
+                                            <p:cond delay="0"/>
+                                          </p:stCondLst>
+                                        </p:cTn>
+                                        <p:tgtEl>
+                                          <p:spTgt spid="7"/>
+                                        </p:tgtEl>
+                                        <p:attrNameLst>
+                                          <p:attrName>style.visibility</p:attrName>
+                                        </p:attrNameLst>
+                                      </p:cBhvr>
+                                      <p:to>
+                                        <p:strVal val="visible"/>
+                                      </p:to>
+                                    </p:set>
+                                    <p:animEffect transition="in" filter="fade">
+                                      <p:cBhvr>
+                                        <p:cTn id="41" dur="500"/>
+                                        <p:tgtEl>
+                                          <p:spTgt spid="7"/>
+                                        </p:tgtEl>
+                                      </p:cBhvr>
+                                    </p:animEffect>
+                                  </p:childTnLst>
+                                </p:cTn>
+                              </p:par>
+                              <p:par>
+                                <p:cTn id="42" presetID="10" presetClass="entr" presetSubtype="0" fill="hold" nodeType="withEffect">
+                                  <p:stCondLst>
+                                    <p:cond delay="0"/>
+                                  </p:stCondLst>
+                                  <p:childTnLst>
+                                    <p:set>
+                                      <p:cBhvr>
+                                        <p:cTn id="43" dur="1" fill="hold">
+                                          <p:stCondLst>
+                                            <p:cond delay="0"/>
+                                          </p:stCondLst>
+                                        </p:cTn>
+                                        <p:tgtEl>
+                                          <p:spTgt spid="9"/>
+                                        </p:tgtEl>
+                                        <p:attrNameLst>
+                                          <p:attrName>style.visibility</p:attrName>
+                                        </p:attrNameLst>
+                                      </p:cBhvr>
+                                      <p:to>
+                                        <p:strVal val="visible"/>
+                                      </p:to>
+                                    </p:set>
+                                    <p:animEffect transition="in" filter="fade">
+                                      <p:cBhvr>
+                                        <p:cTn id="44" dur="500"/>
+                                        <p:tgtEl>
+                                          <p:spTgt spid="9"/>
+                                        </p:tgtEl>
+                                      </p:cBhvr>
+                                    </p:animEffect>
+                                  </p:childTnLst>
+                                </p:cTn>
+                              </p:par>
+                            </p:childTnLst>
+                          </p:cTn>
+                        </p:par>
+                      </p:childTnLst>
+                    </p:cTn>
+                  </p:par>
+                  <p:par>
+                    <p:cTn id="45" fill="hold">
+                      <p:stCondLst>
+                        <p:cond delay="indefinite"/>
+                      </p:stCondLst>
+                      <p:childTnLst>
+                        <p:par>
+                          <p:cTn id="46" fill="hold">
+                            <p:stCondLst>
+                              <p:cond delay="0"/>
+                            </p:stCondLst>
+                            <p:childTnLst>
+                              <p:par>
+                                <p:cTn id="47" presetID="10" presetClass="entr" presetSubtype="0" fill="hold" nodeType="clickEffect">
+                                  <p:stCondLst>
+                                    <p:cond delay="0"/>
+                                  </p:stCondLst>
+                                  <p:childTnLst>
+                                    <p:set>
+                                      <p:cBhvr>
+                                        <p:cTn id="48" dur="1" fill="hold">
+                                          <p:stCondLst>
+                                            <p:cond delay="0"/>
+                                          </p:stCondLst>
+                                        </p:cTn>
+                                        <p:tgtEl>
+                                          <p:spTgt spid="4">
+                                            <p:txEl>
+                                              <p:pRg st="2" end="2"/>
+                                            </p:txEl>
+                                          </p:spTgt>
+                                        </p:tgtEl>
+                                        <p:attrNameLst>
+                                          <p:attrName>style.visibility</p:attrName>
+                                        </p:attrNameLst>
+                                      </p:cBhvr>
+                                      <p:to>
+                                        <p:strVal val="visible"/>
+                                      </p:to>
+                                    </p:set>
+                                    <p:animEffect transition="in" filter="fade">
+                                      <p:cBhvr>
+                                        <p:cTn id="49" dur="500"/>
+                                        <p:tgtEl>
+                                          <p:spTgt spid="4">
+                                            <p:txEl>
+                                              <p:pRg st="2" end="2"/>
+                                            </p:txEl>
+                                          </p:spTgt>
+                                        </p:tgtEl>
+                                      </p:cBhvr>
+                                    </p:animEffect>
+                                  </p:childTnLst>
+                                </p:cTn>
+                              </p:par>
+                            </p:childTnLst>
+                          </p:cTn>
+                        </p:par>
+                      </p:childTnLst>
+                    </p:cTn>
+                  </p:par>
+                  <p:par>
+                    <p:cTn id="50" fill="hold">
+                      <p:stCondLst>
+                        <p:cond delay="indefinite"/>
+                      </p:stCondLst>
+                      <p:childTnLst>
+                        <p:par>
+                          <p:cTn id="51" fill="hold">
+                            <p:stCondLst>
+                              <p:cond delay="0"/>
+                            </p:stCondLst>
+                            <p:childTnLst>
+                              <p:par>
+                                <p:cTn id="52" presetID="10" presetClass="entr" presetSubtype="0" fill="hold" nodeType="clickEffect">
+                                  <p:stCondLst>
+                                    <p:cond delay="0"/>
+                                  </p:stCondLst>
+                                  <p:childTnLst>
+                                    <p:set>
+                                      <p:cBhvr>
+                                        <p:cTn id="53" dur="1" fill="hold">
+                                          <p:stCondLst>
+                                            <p:cond delay="0"/>
+                                          </p:stCondLst>
+                                        </p:cTn>
+                                        <p:tgtEl>
+                                          <p:spTgt spid="4">
+                                            <p:txEl>
+                                              <p:pRg st="3" end="3"/>
+                                            </p:txEl>
+                                          </p:spTgt>
+                                        </p:tgtEl>
+                                        <p:attrNameLst>
+                                          <p:attrName>style.visibility</p:attrName>
+                                        </p:attrNameLst>
+                                      </p:cBhvr>
+                                      <p:to>
+                                        <p:strVal val="visible"/>
+                                      </p:to>
+                                    </p:set>
+                                    <p:animEffect transition="in" filter="fade">
+                                      <p:cBhvr>
+                                        <p:cTn id="54" dur="500"/>
+                                        <p:tgtEl>
+                                          <p:spTgt spid="4">
+                                            <p:txEl>
+                                              <p:pRg st="3" end="3"/>
+                                            </p:txEl>
+                                          </p:spTgt>
+                                        </p:tgtEl>
+                                      </p:cBhvr>
+                                    </p:animEffect>
+                                  </p:childTnLst>
+                                </p:cTn>
+                              </p:par>
+                            </p:childTnLst>
+                          </p:cTn>
+                        </p:par>
+                      </p:childTnLst>
+                    </p:cTn>
+                  </p:par>
+                </p:childTnLst>
+              </p:cTn>
+              <p:prevCondLst>
+                <p:cond evt="onPrev" delay="0">
+                  <p:tgtEl>
+                    <p:sldTgt/>
+                  </p:tgtEl>
+                </p:cond>
+              </p:prevCondLst>
+              <p:nextCondLst>
+                <p:cond evt="onNext" delay="0">
+                  <p:tgtEl>
+                    <p:sldTgt/>
+                  </p:tgtEl>
+                </p:cond>
+              </p:nextCondLst>
+            </p:seq>
+          </p:childTnLst>
+        </p:cTn>
+      </p:par>
+    </p:tnLst>
+    <p:bldLst>
+      <p:bldP spid="6" grpId="0" animBg="1"/>
+      <p:bldP spid="7" grpId="0"/>
+      <p:bldP spid="13" grpId="0"/>
+      <p:bldP spid="14" grpId="0"/>
+    </p:bldLst>
+  </p:timing>
+</p:sld>
+</file>
+
+<file path=ppt/slides/slide11.xml><?xml version="1.0" encoding="utf-8"?>
+<p:sld xmlns:a="http://schemas.openxmlformats.org/drawingml/2006/main" xmlns:r="http://schemas.openxmlformats.org/officeDocument/2006/relationships" xmlns:p="http://schemas.openxmlformats.org/presentationml/2006/main">
+  <p:cSld>
+    <p:spTree>
+      <p:nvGrpSpPr>
+        <p:cNvPr id="1" name=""/>
+        <p:cNvGrpSpPr/>
+        <p:nvPr/>
+      </p:nvGrpSpPr>
+      <p:grpSpPr>
+        <a:xfrm>
+          <a:off x="0" y="0"/>
+          <a:ext cx="0" cy="0"/>
+          <a:chOff x="0" y="0"/>
+          <a:chExt cx="0" cy="0"/>
+        </a:xfrm>
+      </p:grpSpPr>
+      <p:sp>
+        <p:nvSpPr>
+          <p:cNvPr id="2" name="Title 1"/>
+          <p:cNvSpPr>
+            <a:spLocks noGrp="1"/>
+          </p:cNvSpPr>
+          <p:nvPr>
+            <p:ph type="title"/>
+          </p:nvPr>
+        </p:nvSpPr>
+        <p:spPr/>
+        <p:txBody>
+          <a:bodyPr>
+            <a:normAutofit/>
+          </a:bodyPr>
+          <a:lstStyle/>
+          <a:p>
+            <a:r>
+              <a:rPr lang="en-US" dirty="0" smtClean="0"/>
+              <a:t>Descriptive Statistics</a:t>
+            </a:r>
+            <a:endParaRPr lang="en-US" dirty="0"/>
+          </a:p>
+        </p:txBody>
+      </p:sp>
+      <p:pic>
+        <p:nvPicPr>
           <p:cNvPr id="7" name="Content Placeholder 6"/>
           <p:cNvPicPr>
             <a:picLocks noGrp="1" noChangeAspect="1"/>
@@ -5579,7 +6630,7 @@
         </p:spPr>
         <p:txBody>
           <a:bodyPr>
-            <a:normAutofit fontScale="92500"/>
+            <a:normAutofit/>
           </a:bodyPr>
           <a:lstStyle/>
           <a:p>
@@ -5597,15 +6648,13 @@
           <a:p>
             <a:r>
               <a:rPr lang="en-US" dirty="0" smtClean="0"/>
-              <a:t>Five-number summary and then some</a:t>
-            </a:r>
-          </a:p>
-          <a:p>
-            <a:r>
-              <a:rPr lang="en-US" dirty="0" smtClean="0"/>
-              <a:t>What about the data points?</a:t>
-            </a:r>
-            <a:endParaRPr lang="en-US" dirty="0"/>
+              <a:t>Five-number summary and </a:t>
+            </a:r>
+            <a:r>
+              <a:rPr lang="en-US" smtClean="0"/>
+              <a:t>then some</a:t>
+            </a:r>
+            <a:endParaRPr lang="en-US" dirty="0" smtClean="0"/>
           </a:p>
         </p:txBody>
       </p:sp>
@@ -5911,43 +6960,21 @@
                                   </p:childTnLst>
                                 </p:cTn>
                               </p:par>
-                            </p:childTnLst>
-                          </p:cTn>
-                        </p:par>
-                      </p:childTnLst>
-                    </p:cTn>
-                  </p:par>
-                  <p:par>
-                    <p:cTn id="21" fill="hold">
-                      <p:stCondLst>
-                        <p:cond delay="indefinite"/>
-                      </p:stCondLst>
-                      <p:childTnLst>
-                        <p:par>
-                          <p:cTn id="22" fill="hold">
-                            <p:stCondLst>
-                              <p:cond delay="0"/>
-                            </p:stCondLst>
-                            <p:childTnLst>
                               <p:par>
-                                <p:cTn id="23" presetID="10" presetClass="entr" presetSubtype="0" fill="hold" nodeType="clickEffect">
+                                <p:cTn id="21" presetID="10" presetClass="entr" presetSubtype="0" fill="hold" nodeType="withEffect">
                                   <p:stCondLst>
                                     <p:cond delay="0"/>
                                   </p:stCondLst>
                                   <p:childTnLst>
                                     <p:set>
                                       <p:cBhvr>
-                                        <p:cTn id="24" dur="1" fill="hold">
+                                        <p:cTn id="22" dur="1" fill="hold">
                                           <p:stCondLst>
                                             <p:cond delay="0"/>
                                           </p:stCondLst>
                                         </p:cTn>
                                         <p:tgtEl>
-                                          <p:spTgt spid="6">
-                                            <p:txEl>
-                                              <p:pRg st="3" end="3"/>
-                                            </p:txEl>
-                                          </p:spTgt>
+                                          <p:spTgt spid="10"/>
                                         </p:tgtEl>
                                         <p:attrNameLst>
                                           <p:attrName>style.visibility</p:attrName>
@@ -5959,13 +6986,9 @@
                                     </p:set>
                                     <p:animEffect transition="in" filter="fade">
                                       <p:cBhvr>
-                                        <p:cTn id="25" dur="500"/>
-                                        <p:tgtEl>
-                                          <p:spTgt spid="6">
-                                            <p:txEl>
-                                              <p:pRg st="3" end="3"/>
-                                            </p:txEl>
-                                          </p:spTgt>
+                                        <p:cTn id="23" dur="500"/>
+                                        <p:tgtEl>
+                                          <p:spTgt spid="10"/>
                                         </p:tgtEl>
                                       </p:cBhvr>
                                     </p:animEffect>
@@ -5973,20 +6996,20 @@
                                 </p:cTn>
                               </p:par>
                               <p:par>
-                                <p:cTn id="26" presetID="10" presetClass="entr" presetSubtype="0" fill="hold" nodeType="withEffect">
+                                <p:cTn id="24" presetID="10" presetClass="entr" presetSubtype="0" fill="hold" grpId="0" nodeType="withEffect">
                                   <p:stCondLst>
                                     <p:cond delay="0"/>
                                   </p:stCondLst>
                                   <p:childTnLst>
                                     <p:set>
                                       <p:cBhvr>
-                                        <p:cTn id="27" dur="1" fill="hold">
+                                        <p:cTn id="25" dur="1" fill="hold">
                                           <p:stCondLst>
                                             <p:cond delay="0"/>
                                           </p:stCondLst>
                                         </p:cTn>
                                         <p:tgtEl>
-                                          <p:spTgt spid="10"/>
+                                          <p:spTgt spid="14"/>
                                         </p:tgtEl>
                                         <p:attrNameLst>
                                           <p:attrName>style.visibility</p:attrName>
@@ -5998,42 +7021,7 @@
                                     </p:set>
                                     <p:animEffect transition="in" filter="fade">
                                       <p:cBhvr>
-                                        <p:cTn id="28" dur="500"/>
-                                        <p:tgtEl>
-                                          <p:spTgt spid="10"/>
-                                        </p:tgtEl>
-                                      </p:cBhvr>
-                                    </p:animEffect>
-                                  </p:childTnLst>
-                                </p:cTn>
-                              </p:par>
-                              <p:par>
-                                <p:cTn id="29" presetID="10" presetClass="entr" presetSubtype="0" fill="hold" grpId="0" nodeType="withEffect">
-                                  <p:stCondLst>
-                                    <p:cond delay="0"/>
-                                  </p:stCondLst>
-                                  <p:childTnLst>
-                                    <p:set>
-                                      <p:cBhvr>
-                                        <p:cTn id="30" dur="1" fill="hold">
-                                          <p:stCondLst>
-                                            <p:cond delay="0"/>
-                                          </p:stCondLst>
-                                        </p:cTn>
-                                        <p:tgtEl>
-                                          <p:spTgt spid="14"/>
-                                        </p:tgtEl>
-                                        <p:attrNameLst>
-                                          <p:attrName>style.visibility</p:attrName>
-                                        </p:attrNameLst>
-                                      </p:cBhvr>
-                                      <p:to>
-                                        <p:strVal val="visible"/>
-                                      </p:to>
-                                    </p:set>
-                                    <p:animEffect transition="in" filter="fade">
-                                      <p:cBhvr>
-                                        <p:cTn id="31" dur="500"/>
+                                        <p:cTn id="26" dur="500"/>
                                         <p:tgtEl>
                                           <p:spTgt spid="14"/>
                                         </p:tgtEl>
@@ -6076,7 +7064,7 @@
 </p:sld>
 </file>
 
-<file path=ppt/slides/slide11.xml><?xml version="1.0" encoding="utf-8"?>
+<file path=ppt/slides/slide12.xml><?xml version="1.0" encoding="utf-8"?>
 <p:sld xmlns:a="http://schemas.openxmlformats.org/drawingml/2006/main" xmlns:r="http://schemas.openxmlformats.org/officeDocument/2006/relationships" xmlns:p="http://schemas.openxmlformats.org/presentationml/2006/main">
   <p:cSld>
     <p:spTree>
@@ -7179,7 +8167,7 @@
 </p:sld>
 </file>
 
-<file path=ppt/slides/slide12.xml><?xml version="1.0" encoding="utf-8"?>
+<file path=ppt/slides/slide13.xml><?xml version="1.0" encoding="utf-8"?>
 <p:sld xmlns:a="http://schemas.openxmlformats.org/drawingml/2006/main" xmlns:r="http://schemas.openxmlformats.org/officeDocument/2006/relationships" xmlns:p="http://schemas.openxmlformats.org/presentationml/2006/main">
   <p:cSld>
     <p:spTree>
@@ -7357,7 +8345,7 @@
 </p:sld>
 </file>
 
-<file path=ppt/slides/slide13.xml><?xml version="1.0" encoding="utf-8"?>
+<file path=ppt/slides/slide14.xml><?xml version="1.0" encoding="utf-8"?>
 <p:sld xmlns:a="http://schemas.openxmlformats.org/drawingml/2006/main" xmlns:r="http://schemas.openxmlformats.org/officeDocument/2006/relationships" xmlns:p="http://schemas.openxmlformats.org/presentationml/2006/main">
   <p:cSld>
     <p:spTree>
@@ -7734,7 +8722,7 @@
 </p:sld>
 </file>
 
-<file path=ppt/slides/slide14.xml><?xml version="1.0" encoding="utf-8"?>
+<file path=ppt/slides/slide15.xml><?xml version="1.0" encoding="utf-8"?>
 <p:sld xmlns:a="http://schemas.openxmlformats.org/drawingml/2006/main" xmlns:r="http://schemas.openxmlformats.org/officeDocument/2006/relationships" xmlns:p="http://schemas.openxmlformats.org/presentationml/2006/main">
   <p:cSld>
     <p:spTree>
@@ -7904,7 +8892,7 @@
 </p:sld>
 </file>
 
-<file path=ppt/slides/slide15.xml><?xml version="1.0" encoding="utf-8"?>
+<file path=ppt/slides/slide16.xml><?xml version="1.0" encoding="utf-8"?>
 <p:sld xmlns:a="http://schemas.openxmlformats.org/drawingml/2006/main" xmlns:r="http://schemas.openxmlformats.org/officeDocument/2006/relationships" xmlns:p="http://schemas.openxmlformats.org/presentationml/2006/main">
   <p:cSld>
     <p:spTree>
@@ -8601,7 +9589,7 @@
 </p:sld>
 </file>
 
-<file path=ppt/slides/slide16.xml><?xml version="1.0" encoding="utf-8"?>
+<file path=ppt/slides/slide17.xml><?xml version="1.0" encoding="utf-8"?>
 <p:sld xmlns:a="http://schemas.openxmlformats.org/drawingml/2006/main" xmlns:r="http://schemas.openxmlformats.org/officeDocument/2006/relationships" xmlns:p="http://schemas.openxmlformats.org/presentationml/2006/main">
   <p:cSld>
     <p:spTree>
@@ -9997,7 +10985,7 @@
 </p:sld>
 </file>
 
-<file path=ppt/slides/slide17.xml><?xml version="1.0" encoding="utf-8"?>
+<file path=ppt/slides/slide18.xml><?xml version="1.0" encoding="utf-8"?>
 <p:sld xmlns:a="http://schemas.openxmlformats.org/drawingml/2006/main" xmlns:r="http://schemas.openxmlformats.org/officeDocument/2006/relationships" xmlns:p="http://schemas.openxmlformats.org/presentationml/2006/main">
   <p:cSld>
     <p:spTree>
@@ -10946,7 +11934,7 @@
 </p:sld>
 </file>
 
-<file path=ppt/slides/slide18.xml><?xml version="1.0" encoding="utf-8"?>
+<file path=ppt/slides/slide19.xml><?xml version="1.0" encoding="utf-8"?>
 <p:sld xmlns:a="http://schemas.openxmlformats.org/drawingml/2006/main" xmlns:r="http://schemas.openxmlformats.org/officeDocument/2006/relationships" xmlns:p="http://schemas.openxmlformats.org/presentationml/2006/main">
   <p:cSld>
     <p:spTree>
@@ -11967,7 +12955,825 @@
 </p:sld>
 </file>
 
-<file path=ppt/slides/slide19.xml><?xml version="1.0" encoding="utf-8"?>
+<file path=ppt/slides/slide2.xml><?xml version="1.0" encoding="utf-8"?>
+<p:sld xmlns:a="http://schemas.openxmlformats.org/drawingml/2006/main" xmlns:r="http://schemas.openxmlformats.org/officeDocument/2006/relationships" xmlns:p="http://schemas.openxmlformats.org/presentationml/2006/main">
+  <p:cSld>
+    <p:spTree>
+      <p:nvGrpSpPr>
+        <p:cNvPr id="1" name=""/>
+        <p:cNvGrpSpPr/>
+        <p:nvPr/>
+      </p:nvGrpSpPr>
+      <p:grpSpPr>
+        <a:xfrm>
+          <a:off x="0" y="0"/>
+          <a:ext cx="0" cy="0"/>
+          <a:chOff x="0" y="0"/>
+          <a:chExt cx="0" cy="0"/>
+        </a:xfrm>
+      </p:grpSpPr>
+      <p:sp>
+        <p:nvSpPr>
+          <p:cNvPr id="2" name="Title 1"/>
+          <p:cNvSpPr>
+            <a:spLocks noGrp="1"/>
+          </p:cNvSpPr>
+          <p:nvPr>
+            <p:ph type="title"/>
+          </p:nvPr>
+        </p:nvSpPr>
+        <p:spPr/>
+        <p:txBody>
+          <a:bodyPr/>
+          <a:lstStyle/>
+          <a:p>
+            <a:r>
+              <a:rPr lang="en-US" dirty="0" smtClean="0"/>
+              <a:t>Outline</a:t>
+            </a:r>
+            <a:endParaRPr lang="en-US" dirty="0"/>
+          </a:p>
+        </p:txBody>
+      </p:sp>
+      <p:sp>
+        <p:nvSpPr>
+          <p:cNvPr id="3" name="Content Placeholder 2"/>
+          <p:cNvSpPr>
+            <a:spLocks noGrp="1"/>
+          </p:cNvSpPr>
+          <p:nvPr>
+            <p:ph idx="1"/>
+          </p:nvPr>
+        </p:nvSpPr>
+        <p:spPr/>
+        <p:txBody>
+          <a:bodyPr>
+            <a:normAutofit lnSpcReduction="10000"/>
+          </a:bodyPr>
+          <a:lstStyle/>
+          <a:p>
+            <a:r>
+              <a:rPr lang="en-US" dirty="0" smtClean="0"/>
+              <a:t>A Real-World Example</a:t>
+            </a:r>
+          </a:p>
+          <a:p>
+            <a:r>
+              <a:rPr lang="en-US" dirty="0" smtClean="0"/>
+              <a:t>The </a:t>
+            </a:r>
+            <a:r>
+              <a:rPr lang="en-US" dirty="0" smtClean="0"/>
+              <a:t>Box-and-Whisker Plot</a:t>
+            </a:r>
+          </a:p>
+          <a:p>
+            <a:r>
+              <a:rPr lang="en-US" dirty="0" smtClean="0"/>
+              <a:t>Side-by-Side</a:t>
+            </a:r>
+            <a:endParaRPr lang="en-US" dirty="0"/>
+          </a:p>
+          <a:p>
+            <a:r>
+              <a:rPr lang="en-US" dirty="0"/>
+              <a:t>The Violin </a:t>
+            </a:r>
+            <a:r>
+              <a:rPr lang="en-US" dirty="0" smtClean="0"/>
+              <a:t>Plot</a:t>
+            </a:r>
+          </a:p>
+          <a:p>
+            <a:pPr lvl="1"/>
+            <a:r>
+              <a:rPr lang="en-US" dirty="0" smtClean="0"/>
+              <a:t>Kernel Density Estimates</a:t>
+            </a:r>
+            <a:endParaRPr lang="en-US" dirty="0"/>
+          </a:p>
+          <a:p>
+            <a:pPr lvl="1"/>
+            <a:r>
+              <a:rPr lang="en-US" dirty="0" smtClean="0"/>
+              <a:t>Descriptive </a:t>
+            </a:r>
+            <a:r>
+              <a:rPr lang="en-US" dirty="0"/>
+              <a:t>Statistics</a:t>
+            </a:r>
+          </a:p>
+          <a:p>
+            <a:pPr lvl="1"/>
+            <a:r>
+              <a:rPr lang="en-US" dirty="0"/>
+              <a:t>Jittered, Grouped, and </a:t>
+            </a:r>
+            <a:r>
+              <a:rPr lang="en-US" dirty="0" smtClean="0"/>
+              <a:t>Trend Lined</a:t>
+            </a:r>
+            <a:endParaRPr lang="en-US" dirty="0"/>
+          </a:p>
+          <a:p>
+            <a:r>
+              <a:rPr lang="en-US" dirty="0"/>
+              <a:t>Prepping the </a:t>
+            </a:r>
+            <a:r>
+              <a:rPr lang="en-US" dirty="0" smtClean="0"/>
+              <a:t>Data</a:t>
+            </a:r>
+            <a:endParaRPr lang="en-US" dirty="0"/>
+          </a:p>
+          <a:p>
+            <a:r>
+              <a:rPr lang="en-US" dirty="0"/>
+              <a:t>Plotting </a:t>
+            </a:r>
+            <a:r>
+              <a:rPr lang="en-US" dirty="0" smtClean="0"/>
+              <a:t>– Now with Panels</a:t>
+            </a:r>
+            <a:endParaRPr lang="en-US" dirty="0"/>
+          </a:p>
+          <a:p>
+            <a:r>
+              <a:rPr lang="en-US" dirty="0"/>
+              <a:t>The </a:t>
+            </a:r>
+            <a:r>
+              <a:rPr lang="en-US" dirty="0" smtClean="0"/>
+              <a:t>Macro: %</a:t>
+            </a:r>
+            <a:r>
+              <a:rPr lang="en-US" b="1" i="1" dirty="0" err="1" smtClean="0"/>
+              <a:t>violinPlot</a:t>
+            </a:r>
+            <a:endParaRPr lang="en-US" b="1" i="1" dirty="0"/>
+          </a:p>
+          <a:p>
+            <a:endParaRPr lang="en-US" dirty="0" smtClean="0"/>
+          </a:p>
+        </p:txBody>
+      </p:sp>
+    </p:spTree>
+    <p:extLst>
+      <p:ext uri="{BB962C8B-B14F-4D97-AF65-F5344CB8AC3E}">
+        <p14:creationId xmlns:p14="http://schemas.microsoft.com/office/powerpoint/2010/main" val="431031757"/>
+      </p:ext>
+    </p:extLst>
+  </p:cSld>
+  <p:clrMapOvr>
+    <a:masterClrMapping/>
+  </p:clrMapOvr>
+  <p:transition spd="med">
+    <p:fade/>
+  </p:transition>
+  <p:timing>
+    <p:tnLst>
+      <p:par>
+        <p:cTn id="1" dur="indefinite" restart="never" nodeType="tmRoot">
+          <p:childTnLst>
+            <p:seq concurrent="1" nextAc="seek">
+              <p:cTn id="2" dur="indefinite" nodeType="mainSeq">
+                <p:childTnLst>
+                  <p:par>
+                    <p:cTn id="3" fill="hold">
+                      <p:stCondLst>
+                        <p:cond delay="indefinite"/>
+                      </p:stCondLst>
+                      <p:childTnLst>
+                        <p:par>
+                          <p:cTn id="4" fill="hold">
+                            <p:stCondLst>
+                              <p:cond delay="0"/>
+                            </p:stCondLst>
+                            <p:childTnLst>
+                              <p:par>
+                                <p:cTn id="5" presetID="10" presetClass="entr" presetSubtype="0" fill="hold" nodeType="clickEffect">
+                                  <p:stCondLst>
+                                    <p:cond delay="0"/>
+                                  </p:stCondLst>
+                                  <p:childTnLst>
+                                    <p:set>
+                                      <p:cBhvr>
+                                        <p:cTn id="6" dur="1" fill="hold">
+                                          <p:stCondLst>
+                                            <p:cond delay="0"/>
+                                          </p:stCondLst>
+                                        </p:cTn>
+                                        <p:tgtEl>
+                                          <p:spTgt spid="3">
+                                            <p:txEl>
+                                              <p:pRg st="1" end="1"/>
+                                            </p:txEl>
+                                          </p:spTgt>
+                                        </p:tgtEl>
+                                        <p:attrNameLst>
+                                          <p:attrName>style.visibility</p:attrName>
+                                        </p:attrNameLst>
+                                      </p:cBhvr>
+                                      <p:to>
+                                        <p:strVal val="visible"/>
+                                      </p:to>
+                                    </p:set>
+                                    <p:animEffect transition="in" filter="fade">
+                                      <p:cBhvr>
+                                        <p:cTn id="7" dur="500"/>
+                                        <p:tgtEl>
+                                          <p:spTgt spid="3">
+                                            <p:txEl>
+                                              <p:pRg st="1" end="1"/>
+                                            </p:txEl>
+                                          </p:spTgt>
+                                        </p:tgtEl>
+                                      </p:cBhvr>
+                                    </p:animEffect>
+                                  </p:childTnLst>
+                                </p:cTn>
+                              </p:par>
+                            </p:childTnLst>
+                          </p:cTn>
+                        </p:par>
+                      </p:childTnLst>
+                    </p:cTn>
+                  </p:par>
+                  <p:par>
+                    <p:cTn id="8" fill="hold">
+                      <p:stCondLst>
+                        <p:cond delay="indefinite"/>
+                      </p:stCondLst>
+                      <p:childTnLst>
+                        <p:par>
+                          <p:cTn id="9" fill="hold">
+                            <p:stCondLst>
+                              <p:cond delay="0"/>
+                            </p:stCondLst>
+                            <p:childTnLst>
+                              <p:par>
+                                <p:cTn id="10" presetID="10" presetClass="entr" presetSubtype="0" fill="hold" nodeType="clickEffect">
+                                  <p:stCondLst>
+                                    <p:cond delay="0"/>
+                                  </p:stCondLst>
+                                  <p:childTnLst>
+                                    <p:set>
+                                      <p:cBhvr>
+                                        <p:cTn id="11" dur="1" fill="hold">
+                                          <p:stCondLst>
+                                            <p:cond delay="0"/>
+                                          </p:stCondLst>
+                                        </p:cTn>
+                                        <p:tgtEl>
+                                          <p:spTgt spid="3">
+                                            <p:txEl>
+                                              <p:pRg st="0" end="0"/>
+                                            </p:txEl>
+                                          </p:spTgt>
+                                        </p:tgtEl>
+                                        <p:attrNameLst>
+                                          <p:attrName>style.visibility</p:attrName>
+                                        </p:attrNameLst>
+                                      </p:cBhvr>
+                                      <p:to>
+                                        <p:strVal val="visible"/>
+                                      </p:to>
+                                    </p:set>
+                                    <p:animEffect transition="in" filter="fade">
+                                      <p:cBhvr>
+                                        <p:cTn id="12" dur="500"/>
+                                        <p:tgtEl>
+                                          <p:spTgt spid="3">
+                                            <p:txEl>
+                                              <p:pRg st="0" end="0"/>
+                                            </p:txEl>
+                                          </p:spTgt>
+                                        </p:tgtEl>
+                                      </p:cBhvr>
+                                    </p:animEffect>
+                                  </p:childTnLst>
+                                </p:cTn>
+                              </p:par>
+                            </p:childTnLst>
+                          </p:cTn>
+                        </p:par>
+                      </p:childTnLst>
+                    </p:cTn>
+                  </p:par>
+                  <p:par>
+                    <p:cTn id="13" fill="hold">
+                      <p:stCondLst>
+                        <p:cond delay="indefinite"/>
+                      </p:stCondLst>
+                      <p:childTnLst>
+                        <p:par>
+                          <p:cTn id="14" fill="hold">
+                            <p:stCondLst>
+                              <p:cond delay="0"/>
+                            </p:stCondLst>
+                            <p:childTnLst>
+                              <p:par>
+                                <p:cTn id="15" presetID="10" presetClass="entr" presetSubtype="0" fill="hold" nodeType="clickEffect">
+                                  <p:stCondLst>
+                                    <p:cond delay="0"/>
+                                  </p:stCondLst>
+                                  <p:childTnLst>
+                                    <p:set>
+                                      <p:cBhvr>
+                                        <p:cTn id="16" dur="1" fill="hold">
+                                          <p:stCondLst>
+                                            <p:cond delay="0"/>
+                                          </p:stCondLst>
+                                        </p:cTn>
+                                        <p:tgtEl>
+                                          <p:spTgt spid="3">
+                                            <p:txEl>
+                                              <p:pRg st="2" end="2"/>
+                                            </p:txEl>
+                                          </p:spTgt>
+                                        </p:tgtEl>
+                                        <p:attrNameLst>
+                                          <p:attrName>style.visibility</p:attrName>
+                                        </p:attrNameLst>
+                                      </p:cBhvr>
+                                      <p:to>
+                                        <p:strVal val="visible"/>
+                                      </p:to>
+                                    </p:set>
+                                    <p:animEffect transition="in" filter="fade">
+                                      <p:cBhvr>
+                                        <p:cTn id="17" dur="500"/>
+                                        <p:tgtEl>
+                                          <p:spTgt spid="3">
+                                            <p:txEl>
+                                              <p:pRg st="2" end="2"/>
+                                            </p:txEl>
+                                          </p:spTgt>
+                                        </p:tgtEl>
+                                      </p:cBhvr>
+                                    </p:animEffect>
+                                  </p:childTnLst>
+                                </p:cTn>
+                              </p:par>
+                            </p:childTnLst>
+                          </p:cTn>
+                        </p:par>
+                      </p:childTnLst>
+                    </p:cTn>
+                  </p:par>
+                  <p:par>
+                    <p:cTn id="18" fill="hold">
+                      <p:stCondLst>
+                        <p:cond delay="indefinite"/>
+                      </p:stCondLst>
+                      <p:childTnLst>
+                        <p:par>
+                          <p:cTn id="19" fill="hold">
+                            <p:stCondLst>
+                              <p:cond delay="0"/>
+                            </p:stCondLst>
+                            <p:childTnLst>
+                              <p:par>
+                                <p:cTn id="20" presetID="10" presetClass="entr" presetSubtype="0" fill="hold" nodeType="clickEffect">
+                                  <p:stCondLst>
+                                    <p:cond delay="0"/>
+                                  </p:stCondLst>
+                                  <p:childTnLst>
+                                    <p:set>
+                                      <p:cBhvr>
+                                        <p:cTn id="21" dur="1" fill="hold">
+                                          <p:stCondLst>
+                                            <p:cond delay="0"/>
+                                          </p:stCondLst>
+                                        </p:cTn>
+                                        <p:tgtEl>
+                                          <p:spTgt spid="3">
+                                            <p:txEl>
+                                              <p:pRg st="3" end="3"/>
+                                            </p:txEl>
+                                          </p:spTgt>
+                                        </p:tgtEl>
+                                        <p:attrNameLst>
+                                          <p:attrName>style.visibility</p:attrName>
+                                        </p:attrNameLst>
+                                      </p:cBhvr>
+                                      <p:to>
+                                        <p:strVal val="visible"/>
+                                      </p:to>
+                                    </p:set>
+                                    <p:animEffect transition="in" filter="fade">
+                                      <p:cBhvr>
+                                        <p:cTn id="22" dur="500"/>
+                                        <p:tgtEl>
+                                          <p:spTgt spid="3">
+                                            <p:txEl>
+                                              <p:pRg st="3" end="3"/>
+                                            </p:txEl>
+                                          </p:spTgt>
+                                        </p:tgtEl>
+                                      </p:cBhvr>
+                                    </p:animEffect>
+                                  </p:childTnLst>
+                                </p:cTn>
+                              </p:par>
+                            </p:childTnLst>
+                          </p:cTn>
+                        </p:par>
+                      </p:childTnLst>
+                    </p:cTn>
+                  </p:par>
+                  <p:par>
+                    <p:cTn id="23" fill="hold">
+                      <p:stCondLst>
+                        <p:cond delay="indefinite"/>
+                      </p:stCondLst>
+                      <p:childTnLst>
+                        <p:par>
+                          <p:cTn id="24" fill="hold">
+                            <p:stCondLst>
+                              <p:cond delay="0"/>
+                            </p:stCondLst>
+                            <p:childTnLst>
+                              <p:par>
+                                <p:cTn id="25" presetID="10" presetClass="entr" presetSubtype="0" fill="hold" nodeType="clickEffect">
+                                  <p:stCondLst>
+                                    <p:cond delay="0"/>
+                                  </p:stCondLst>
+                                  <p:childTnLst>
+                                    <p:set>
+                                      <p:cBhvr>
+                                        <p:cTn id="26" dur="1" fill="hold">
+                                          <p:stCondLst>
+                                            <p:cond delay="0"/>
+                                          </p:stCondLst>
+                                        </p:cTn>
+                                        <p:tgtEl>
+                                          <p:spTgt spid="3">
+                                            <p:txEl>
+                                              <p:pRg st="4" end="4"/>
+                                            </p:txEl>
+                                          </p:spTgt>
+                                        </p:tgtEl>
+                                        <p:attrNameLst>
+                                          <p:attrName>style.visibility</p:attrName>
+                                        </p:attrNameLst>
+                                      </p:cBhvr>
+                                      <p:to>
+                                        <p:strVal val="visible"/>
+                                      </p:to>
+                                    </p:set>
+                                    <p:animEffect transition="in" filter="fade">
+                                      <p:cBhvr>
+                                        <p:cTn id="27" dur="500"/>
+                                        <p:tgtEl>
+                                          <p:spTgt spid="3">
+                                            <p:txEl>
+                                              <p:pRg st="4" end="4"/>
+                                            </p:txEl>
+                                          </p:spTgt>
+                                        </p:tgtEl>
+                                      </p:cBhvr>
+                                    </p:animEffect>
+                                  </p:childTnLst>
+                                </p:cTn>
+                              </p:par>
+                            </p:childTnLst>
+                          </p:cTn>
+                        </p:par>
+                      </p:childTnLst>
+                    </p:cTn>
+                  </p:par>
+                  <p:par>
+                    <p:cTn id="28" fill="hold">
+                      <p:stCondLst>
+                        <p:cond delay="indefinite"/>
+                      </p:stCondLst>
+                      <p:childTnLst>
+                        <p:par>
+                          <p:cTn id="29" fill="hold">
+                            <p:stCondLst>
+                              <p:cond delay="0"/>
+                            </p:stCondLst>
+                            <p:childTnLst>
+                              <p:par>
+                                <p:cTn id="30" presetID="10" presetClass="entr" presetSubtype="0" fill="hold" nodeType="clickEffect">
+                                  <p:stCondLst>
+                                    <p:cond delay="0"/>
+                                  </p:stCondLst>
+                                  <p:childTnLst>
+                                    <p:set>
+                                      <p:cBhvr>
+                                        <p:cTn id="31" dur="1" fill="hold">
+                                          <p:stCondLst>
+                                            <p:cond delay="0"/>
+                                          </p:stCondLst>
+                                        </p:cTn>
+                                        <p:tgtEl>
+                                          <p:spTgt spid="3">
+                                            <p:txEl>
+                                              <p:pRg st="5" end="5"/>
+                                            </p:txEl>
+                                          </p:spTgt>
+                                        </p:tgtEl>
+                                        <p:attrNameLst>
+                                          <p:attrName>style.visibility</p:attrName>
+                                        </p:attrNameLst>
+                                      </p:cBhvr>
+                                      <p:to>
+                                        <p:strVal val="visible"/>
+                                      </p:to>
+                                    </p:set>
+                                    <p:animEffect transition="in" filter="fade">
+                                      <p:cBhvr>
+                                        <p:cTn id="32" dur="500"/>
+                                        <p:tgtEl>
+                                          <p:spTgt spid="3">
+                                            <p:txEl>
+                                              <p:pRg st="5" end="5"/>
+                                            </p:txEl>
+                                          </p:spTgt>
+                                        </p:tgtEl>
+                                      </p:cBhvr>
+                                    </p:animEffect>
+                                  </p:childTnLst>
+                                </p:cTn>
+                              </p:par>
+                            </p:childTnLst>
+                          </p:cTn>
+                        </p:par>
+                      </p:childTnLst>
+                    </p:cTn>
+                  </p:par>
+                  <p:par>
+                    <p:cTn id="33" fill="hold">
+                      <p:stCondLst>
+                        <p:cond delay="indefinite"/>
+                      </p:stCondLst>
+                      <p:childTnLst>
+                        <p:par>
+                          <p:cTn id="34" fill="hold">
+                            <p:stCondLst>
+                              <p:cond delay="0"/>
+                            </p:stCondLst>
+                            <p:childTnLst>
+                              <p:par>
+                                <p:cTn id="35" presetID="10" presetClass="entr" presetSubtype="0" fill="hold" nodeType="clickEffect">
+                                  <p:stCondLst>
+                                    <p:cond delay="0"/>
+                                  </p:stCondLst>
+                                  <p:childTnLst>
+                                    <p:set>
+                                      <p:cBhvr>
+                                        <p:cTn id="36" dur="1" fill="hold">
+                                          <p:stCondLst>
+                                            <p:cond delay="0"/>
+                                          </p:stCondLst>
+                                        </p:cTn>
+                                        <p:tgtEl>
+                                          <p:spTgt spid="3">
+                                            <p:txEl>
+                                              <p:pRg st="6" end="6"/>
+                                            </p:txEl>
+                                          </p:spTgt>
+                                        </p:tgtEl>
+                                        <p:attrNameLst>
+                                          <p:attrName>style.visibility</p:attrName>
+                                        </p:attrNameLst>
+                                      </p:cBhvr>
+                                      <p:to>
+                                        <p:strVal val="visible"/>
+                                      </p:to>
+                                    </p:set>
+                                    <p:animEffect transition="in" filter="fade">
+                                      <p:cBhvr>
+                                        <p:cTn id="37" dur="500"/>
+                                        <p:tgtEl>
+                                          <p:spTgt spid="3">
+                                            <p:txEl>
+                                              <p:pRg st="6" end="6"/>
+                                            </p:txEl>
+                                          </p:spTgt>
+                                        </p:tgtEl>
+                                      </p:cBhvr>
+                                    </p:animEffect>
+                                  </p:childTnLst>
+                                </p:cTn>
+                              </p:par>
+                            </p:childTnLst>
+                          </p:cTn>
+                        </p:par>
+                      </p:childTnLst>
+                    </p:cTn>
+                  </p:par>
+                  <p:par>
+                    <p:cTn id="38" fill="hold">
+                      <p:stCondLst>
+                        <p:cond delay="indefinite"/>
+                      </p:stCondLst>
+                      <p:childTnLst>
+                        <p:par>
+                          <p:cTn id="39" fill="hold">
+                            <p:stCondLst>
+                              <p:cond delay="0"/>
+                            </p:stCondLst>
+                            <p:childTnLst>
+                              <p:par>
+                                <p:cTn id="40" presetID="10" presetClass="entr" presetSubtype="0" fill="hold" nodeType="clickEffect">
+                                  <p:stCondLst>
+                                    <p:cond delay="0"/>
+                                  </p:stCondLst>
+                                  <p:childTnLst>
+                                    <p:set>
+                                      <p:cBhvr>
+                                        <p:cTn id="41" dur="1" fill="hold">
+                                          <p:stCondLst>
+                                            <p:cond delay="0"/>
+                                          </p:stCondLst>
+                                        </p:cTn>
+                                        <p:tgtEl>
+                                          <p:spTgt spid="3">
+                                            <p:txEl>
+                                              <p:pRg st="7" end="7"/>
+                                            </p:txEl>
+                                          </p:spTgt>
+                                        </p:tgtEl>
+                                        <p:attrNameLst>
+                                          <p:attrName>style.visibility</p:attrName>
+                                        </p:attrNameLst>
+                                      </p:cBhvr>
+                                      <p:to>
+                                        <p:strVal val="visible"/>
+                                      </p:to>
+                                    </p:set>
+                                    <p:animEffect transition="in" filter="fade">
+                                      <p:cBhvr>
+                                        <p:cTn id="42" dur="500"/>
+                                        <p:tgtEl>
+                                          <p:spTgt spid="3">
+                                            <p:txEl>
+                                              <p:pRg st="7" end="7"/>
+                                            </p:txEl>
+                                          </p:spTgt>
+                                        </p:tgtEl>
+                                      </p:cBhvr>
+                                    </p:animEffect>
+                                  </p:childTnLst>
+                                </p:cTn>
+                              </p:par>
+                            </p:childTnLst>
+                          </p:cTn>
+                        </p:par>
+                      </p:childTnLst>
+                    </p:cTn>
+                  </p:par>
+                  <p:par>
+                    <p:cTn id="43" fill="hold">
+                      <p:stCondLst>
+                        <p:cond delay="indefinite"/>
+                      </p:stCondLst>
+                      <p:childTnLst>
+                        <p:par>
+                          <p:cTn id="44" fill="hold">
+                            <p:stCondLst>
+                              <p:cond delay="0"/>
+                            </p:stCondLst>
+                            <p:childTnLst>
+                              <p:par>
+                                <p:cTn id="45" presetID="10" presetClass="entr" presetSubtype="0" fill="hold" nodeType="clickEffect">
+                                  <p:stCondLst>
+                                    <p:cond delay="0"/>
+                                  </p:stCondLst>
+                                  <p:childTnLst>
+                                    <p:set>
+                                      <p:cBhvr>
+                                        <p:cTn id="46" dur="1" fill="hold">
+                                          <p:stCondLst>
+                                            <p:cond delay="0"/>
+                                          </p:stCondLst>
+                                        </p:cTn>
+                                        <p:tgtEl>
+                                          <p:spTgt spid="3">
+                                            <p:txEl>
+                                              <p:pRg st="8" end="8"/>
+                                            </p:txEl>
+                                          </p:spTgt>
+                                        </p:tgtEl>
+                                        <p:attrNameLst>
+                                          <p:attrName>style.visibility</p:attrName>
+                                        </p:attrNameLst>
+                                      </p:cBhvr>
+                                      <p:to>
+                                        <p:strVal val="visible"/>
+                                      </p:to>
+                                    </p:set>
+                                    <p:animEffect transition="in" filter="fade">
+                                      <p:cBhvr>
+                                        <p:cTn id="47" dur="500"/>
+                                        <p:tgtEl>
+                                          <p:spTgt spid="3">
+                                            <p:txEl>
+                                              <p:pRg st="8" end="8"/>
+                                            </p:txEl>
+                                          </p:spTgt>
+                                        </p:tgtEl>
+                                      </p:cBhvr>
+                                    </p:animEffect>
+                                  </p:childTnLst>
+                                </p:cTn>
+                              </p:par>
+                            </p:childTnLst>
+                          </p:cTn>
+                        </p:par>
+                      </p:childTnLst>
+                    </p:cTn>
+                  </p:par>
+                  <p:par>
+                    <p:cTn id="48" fill="hold">
+                      <p:stCondLst>
+                        <p:cond delay="indefinite"/>
+                      </p:stCondLst>
+                      <p:childTnLst>
+                        <p:par>
+                          <p:cTn id="49" fill="hold">
+                            <p:stCondLst>
+                              <p:cond delay="0"/>
+                            </p:stCondLst>
+                            <p:childTnLst>
+                              <p:par>
+                                <p:cTn id="50" presetID="10" presetClass="entr" presetSubtype="0" fill="hold" nodeType="clickEffect">
+                                  <p:stCondLst>
+                                    <p:cond delay="0"/>
+                                  </p:stCondLst>
+                                  <p:childTnLst>
+                                    <p:set>
+                                      <p:cBhvr>
+                                        <p:cTn id="51" dur="1" fill="hold">
+                                          <p:stCondLst>
+                                            <p:cond delay="0"/>
+                                          </p:stCondLst>
+                                        </p:cTn>
+                                        <p:tgtEl>
+                                          <p:spTgt spid="3">
+                                            <p:txEl>
+                                              <p:pRg st="9" end="9"/>
+                                            </p:txEl>
+                                          </p:spTgt>
+                                        </p:tgtEl>
+                                        <p:attrNameLst>
+                                          <p:attrName>style.visibility</p:attrName>
+                                        </p:attrNameLst>
+                                      </p:cBhvr>
+                                      <p:to>
+                                        <p:strVal val="visible"/>
+                                      </p:to>
+                                    </p:set>
+                                    <p:animEffect transition="in" filter="fade">
+                                      <p:cBhvr>
+                                        <p:cTn id="52" dur="500"/>
+                                        <p:tgtEl>
+                                          <p:spTgt spid="3">
+                                            <p:txEl>
+                                              <p:pRg st="9" end="9"/>
+                                            </p:txEl>
+                                          </p:spTgt>
+                                        </p:tgtEl>
+                                      </p:cBhvr>
+                                    </p:animEffect>
+                                  </p:childTnLst>
+                                </p:cTn>
+                              </p:par>
+                            </p:childTnLst>
+                          </p:cTn>
+                        </p:par>
+                      </p:childTnLst>
+                    </p:cTn>
+                  </p:par>
+                </p:childTnLst>
+              </p:cTn>
+              <p:prevCondLst>
+                <p:cond evt="onPrev" delay="0">
+                  <p:tgtEl>
+                    <p:sldTgt/>
+                  </p:tgtEl>
+                </p:cond>
+              </p:prevCondLst>
+              <p:nextCondLst>
+                <p:cond evt="onNext" delay="0">
+                  <p:tgtEl>
+                    <p:sldTgt/>
+                  </p:tgtEl>
+                </p:cond>
+              </p:nextCondLst>
+            </p:seq>
+          </p:childTnLst>
+        </p:cTn>
+      </p:par>
+    </p:tnLst>
+  </p:timing>
+</p:sld>
+</file>
+
+<file path=ppt/slides/slide20.xml><?xml version="1.0" encoding="utf-8"?>
 <p:sld xmlns:a="http://schemas.openxmlformats.org/drawingml/2006/main" xmlns:r="http://schemas.openxmlformats.org/officeDocument/2006/relationships" xmlns:p="http://schemas.openxmlformats.org/presentationml/2006/main">
   <p:cSld>
     <p:spTree>
@@ -13704,754 +15510,7 @@
 </p:sld>
 </file>
 
-<file path=ppt/slides/slide2.xml><?xml version="1.0" encoding="utf-8"?>
-<p:sld xmlns:a="http://schemas.openxmlformats.org/drawingml/2006/main" xmlns:r="http://schemas.openxmlformats.org/officeDocument/2006/relationships" xmlns:p="http://schemas.openxmlformats.org/presentationml/2006/main">
-  <p:cSld>
-    <p:spTree>
-      <p:nvGrpSpPr>
-        <p:cNvPr id="1" name=""/>
-        <p:cNvGrpSpPr/>
-        <p:nvPr/>
-      </p:nvGrpSpPr>
-      <p:grpSpPr>
-        <a:xfrm>
-          <a:off x="0" y="0"/>
-          <a:ext cx="0" cy="0"/>
-          <a:chOff x="0" y="0"/>
-          <a:chExt cx="0" cy="0"/>
-        </a:xfrm>
-      </p:grpSpPr>
-      <p:sp>
-        <p:nvSpPr>
-          <p:cNvPr id="2" name="Title 1"/>
-          <p:cNvSpPr>
-            <a:spLocks noGrp="1"/>
-          </p:cNvSpPr>
-          <p:nvPr>
-            <p:ph type="title"/>
-          </p:nvPr>
-        </p:nvSpPr>
-        <p:spPr/>
-        <p:txBody>
-          <a:bodyPr/>
-          <a:lstStyle/>
-          <a:p>
-            <a:r>
-              <a:rPr lang="en-US" dirty="0" smtClean="0"/>
-              <a:t>Outline</a:t>
-            </a:r>
-            <a:endParaRPr lang="en-US" dirty="0"/>
-          </a:p>
-        </p:txBody>
-      </p:sp>
-      <p:sp>
-        <p:nvSpPr>
-          <p:cNvPr id="3" name="Content Placeholder 2"/>
-          <p:cNvSpPr>
-            <a:spLocks noGrp="1"/>
-          </p:cNvSpPr>
-          <p:nvPr>
-            <p:ph idx="1"/>
-          </p:nvPr>
-        </p:nvSpPr>
-        <p:spPr/>
-        <p:txBody>
-          <a:bodyPr>
-            <a:normAutofit/>
-          </a:bodyPr>
-          <a:lstStyle/>
-          <a:p>
-            <a:r>
-              <a:rPr lang="en-US" dirty="0" smtClean="0"/>
-              <a:t>The Box-and-Whisker Plot</a:t>
-            </a:r>
-          </a:p>
-          <a:p>
-            <a:r>
-              <a:rPr lang="en-US" dirty="0" smtClean="0"/>
-              <a:t>Side-by-Side</a:t>
-            </a:r>
-            <a:endParaRPr lang="en-US" dirty="0"/>
-          </a:p>
-          <a:p>
-            <a:r>
-              <a:rPr lang="en-US" dirty="0"/>
-              <a:t>The Violin </a:t>
-            </a:r>
-            <a:r>
-              <a:rPr lang="en-US" dirty="0" smtClean="0"/>
-              <a:t>Plot</a:t>
-            </a:r>
-          </a:p>
-          <a:p>
-            <a:pPr lvl="1"/>
-            <a:r>
-              <a:rPr lang="en-US" dirty="0" smtClean="0"/>
-              <a:t>Kernel Density Estimates</a:t>
-            </a:r>
-            <a:endParaRPr lang="en-US" dirty="0"/>
-          </a:p>
-          <a:p>
-            <a:pPr lvl="1"/>
-            <a:r>
-              <a:rPr lang="en-US" dirty="0" smtClean="0"/>
-              <a:t>Descriptive </a:t>
-            </a:r>
-            <a:r>
-              <a:rPr lang="en-US" dirty="0"/>
-              <a:t>Statistics</a:t>
-            </a:r>
-          </a:p>
-          <a:p>
-            <a:pPr lvl="1"/>
-            <a:r>
-              <a:rPr lang="en-US" dirty="0"/>
-              <a:t>Jittered, Grouped, and </a:t>
-            </a:r>
-            <a:r>
-              <a:rPr lang="en-US" dirty="0" smtClean="0"/>
-              <a:t>Trend Lined</a:t>
-            </a:r>
-            <a:endParaRPr lang="en-US" dirty="0"/>
-          </a:p>
-          <a:p>
-            <a:r>
-              <a:rPr lang="en-US" dirty="0"/>
-              <a:t>Prepping the </a:t>
-            </a:r>
-            <a:r>
-              <a:rPr lang="en-US" dirty="0" smtClean="0"/>
-              <a:t>Data</a:t>
-            </a:r>
-            <a:endParaRPr lang="en-US" dirty="0"/>
-          </a:p>
-          <a:p>
-            <a:r>
-              <a:rPr lang="en-US" dirty="0"/>
-              <a:t>Plotting </a:t>
-            </a:r>
-            <a:r>
-              <a:rPr lang="en-US" dirty="0" smtClean="0"/>
-              <a:t>– Now with Panels</a:t>
-            </a:r>
-            <a:endParaRPr lang="en-US" dirty="0"/>
-          </a:p>
-          <a:p>
-            <a:r>
-              <a:rPr lang="en-US" dirty="0"/>
-              <a:t>The </a:t>
-            </a:r>
-            <a:r>
-              <a:rPr lang="en-US" dirty="0" smtClean="0"/>
-              <a:t>Macro: %</a:t>
-            </a:r>
-            <a:r>
-              <a:rPr lang="en-US" b="1" i="1" dirty="0" err="1" smtClean="0"/>
-              <a:t>violinPlot</a:t>
-            </a:r>
-            <a:endParaRPr lang="en-US" b="1" i="1" dirty="0"/>
-          </a:p>
-          <a:p>
-            <a:endParaRPr lang="en-US" dirty="0" smtClean="0"/>
-          </a:p>
-        </p:txBody>
-      </p:sp>
-    </p:spTree>
-    <p:extLst>
-      <p:ext uri="{BB962C8B-B14F-4D97-AF65-F5344CB8AC3E}">
-        <p14:creationId xmlns:p14="http://schemas.microsoft.com/office/powerpoint/2010/main" val="431031757"/>
-      </p:ext>
-    </p:extLst>
-  </p:cSld>
-  <p:clrMapOvr>
-    <a:masterClrMapping/>
-  </p:clrMapOvr>
-  <p:transition spd="med">
-    <p:fade/>
-  </p:transition>
-  <p:timing>
-    <p:tnLst>
-      <p:par>
-        <p:cTn id="1" dur="indefinite" restart="never" nodeType="tmRoot">
-          <p:childTnLst>
-            <p:seq concurrent="1" nextAc="seek">
-              <p:cTn id="2" dur="indefinite" nodeType="mainSeq">
-                <p:childTnLst>
-                  <p:par>
-                    <p:cTn id="3" fill="hold">
-                      <p:stCondLst>
-                        <p:cond delay="indefinite"/>
-                      </p:stCondLst>
-                      <p:childTnLst>
-                        <p:par>
-                          <p:cTn id="4" fill="hold">
-                            <p:stCondLst>
-                              <p:cond delay="0"/>
-                            </p:stCondLst>
-                            <p:childTnLst>
-                              <p:par>
-                                <p:cTn id="5" presetID="10" presetClass="entr" presetSubtype="0" fill="hold" nodeType="clickEffect">
-                                  <p:stCondLst>
-                                    <p:cond delay="0"/>
-                                  </p:stCondLst>
-                                  <p:childTnLst>
-                                    <p:set>
-                                      <p:cBhvr>
-                                        <p:cTn id="6" dur="1" fill="hold">
-                                          <p:stCondLst>
-                                            <p:cond delay="0"/>
-                                          </p:stCondLst>
-                                        </p:cTn>
-                                        <p:tgtEl>
-                                          <p:spTgt spid="3">
-                                            <p:txEl>
-                                              <p:pRg st="0" end="0"/>
-                                            </p:txEl>
-                                          </p:spTgt>
-                                        </p:tgtEl>
-                                        <p:attrNameLst>
-                                          <p:attrName>style.visibility</p:attrName>
-                                        </p:attrNameLst>
-                                      </p:cBhvr>
-                                      <p:to>
-                                        <p:strVal val="visible"/>
-                                      </p:to>
-                                    </p:set>
-                                    <p:animEffect transition="in" filter="fade">
-                                      <p:cBhvr>
-                                        <p:cTn id="7" dur="500"/>
-                                        <p:tgtEl>
-                                          <p:spTgt spid="3">
-                                            <p:txEl>
-                                              <p:pRg st="0" end="0"/>
-                                            </p:txEl>
-                                          </p:spTgt>
-                                        </p:tgtEl>
-                                      </p:cBhvr>
-                                    </p:animEffect>
-                                  </p:childTnLst>
-                                </p:cTn>
-                              </p:par>
-                            </p:childTnLst>
-                          </p:cTn>
-                        </p:par>
-                      </p:childTnLst>
-                    </p:cTn>
-                  </p:par>
-                  <p:par>
-                    <p:cTn id="8" fill="hold">
-                      <p:stCondLst>
-                        <p:cond delay="indefinite"/>
-                      </p:stCondLst>
-                      <p:childTnLst>
-                        <p:par>
-                          <p:cTn id="9" fill="hold">
-                            <p:stCondLst>
-                              <p:cond delay="0"/>
-                            </p:stCondLst>
-                            <p:childTnLst>
-                              <p:par>
-                                <p:cTn id="10" presetID="10" presetClass="entr" presetSubtype="0" fill="hold" nodeType="clickEffect">
-                                  <p:stCondLst>
-                                    <p:cond delay="0"/>
-                                  </p:stCondLst>
-                                  <p:childTnLst>
-                                    <p:set>
-                                      <p:cBhvr>
-                                        <p:cTn id="11" dur="1" fill="hold">
-                                          <p:stCondLst>
-                                            <p:cond delay="0"/>
-                                          </p:stCondLst>
-                                        </p:cTn>
-                                        <p:tgtEl>
-                                          <p:spTgt spid="3">
-                                            <p:txEl>
-                                              <p:pRg st="1" end="1"/>
-                                            </p:txEl>
-                                          </p:spTgt>
-                                        </p:tgtEl>
-                                        <p:attrNameLst>
-                                          <p:attrName>style.visibility</p:attrName>
-                                        </p:attrNameLst>
-                                      </p:cBhvr>
-                                      <p:to>
-                                        <p:strVal val="visible"/>
-                                      </p:to>
-                                    </p:set>
-                                    <p:animEffect transition="in" filter="fade">
-                                      <p:cBhvr>
-                                        <p:cTn id="12" dur="500"/>
-                                        <p:tgtEl>
-                                          <p:spTgt spid="3">
-                                            <p:txEl>
-                                              <p:pRg st="1" end="1"/>
-                                            </p:txEl>
-                                          </p:spTgt>
-                                        </p:tgtEl>
-                                      </p:cBhvr>
-                                    </p:animEffect>
-                                  </p:childTnLst>
-                                </p:cTn>
-                              </p:par>
-                            </p:childTnLst>
-                          </p:cTn>
-                        </p:par>
-                      </p:childTnLst>
-                    </p:cTn>
-                  </p:par>
-                  <p:par>
-                    <p:cTn id="13" fill="hold">
-                      <p:stCondLst>
-                        <p:cond delay="indefinite"/>
-                      </p:stCondLst>
-                      <p:childTnLst>
-                        <p:par>
-                          <p:cTn id="14" fill="hold">
-                            <p:stCondLst>
-                              <p:cond delay="0"/>
-                            </p:stCondLst>
-                            <p:childTnLst>
-                              <p:par>
-                                <p:cTn id="15" presetID="10" presetClass="entr" presetSubtype="0" fill="hold" nodeType="clickEffect">
-                                  <p:stCondLst>
-                                    <p:cond delay="0"/>
-                                  </p:stCondLst>
-                                  <p:childTnLst>
-                                    <p:set>
-                                      <p:cBhvr>
-                                        <p:cTn id="16" dur="1" fill="hold">
-                                          <p:stCondLst>
-                                            <p:cond delay="0"/>
-                                          </p:stCondLst>
-                                        </p:cTn>
-                                        <p:tgtEl>
-                                          <p:spTgt spid="3">
-                                            <p:txEl>
-                                              <p:pRg st="2" end="2"/>
-                                            </p:txEl>
-                                          </p:spTgt>
-                                        </p:tgtEl>
-                                        <p:attrNameLst>
-                                          <p:attrName>style.visibility</p:attrName>
-                                        </p:attrNameLst>
-                                      </p:cBhvr>
-                                      <p:to>
-                                        <p:strVal val="visible"/>
-                                      </p:to>
-                                    </p:set>
-                                    <p:animEffect transition="in" filter="fade">
-                                      <p:cBhvr>
-                                        <p:cTn id="17" dur="500"/>
-                                        <p:tgtEl>
-                                          <p:spTgt spid="3">
-                                            <p:txEl>
-                                              <p:pRg st="2" end="2"/>
-                                            </p:txEl>
-                                          </p:spTgt>
-                                        </p:tgtEl>
-                                      </p:cBhvr>
-                                    </p:animEffect>
-                                  </p:childTnLst>
-                                </p:cTn>
-                              </p:par>
-                            </p:childTnLst>
-                          </p:cTn>
-                        </p:par>
-                      </p:childTnLst>
-                    </p:cTn>
-                  </p:par>
-                  <p:par>
-                    <p:cTn id="18" fill="hold">
-                      <p:stCondLst>
-                        <p:cond delay="indefinite"/>
-                      </p:stCondLst>
-                      <p:childTnLst>
-                        <p:par>
-                          <p:cTn id="19" fill="hold">
-                            <p:stCondLst>
-                              <p:cond delay="0"/>
-                            </p:stCondLst>
-                            <p:childTnLst>
-                              <p:par>
-                                <p:cTn id="20" presetID="10" presetClass="entr" presetSubtype="0" fill="hold" nodeType="clickEffect">
-                                  <p:stCondLst>
-                                    <p:cond delay="0"/>
-                                  </p:stCondLst>
-                                  <p:childTnLst>
-                                    <p:set>
-                                      <p:cBhvr>
-                                        <p:cTn id="21" dur="1" fill="hold">
-                                          <p:stCondLst>
-                                            <p:cond delay="0"/>
-                                          </p:stCondLst>
-                                        </p:cTn>
-                                        <p:tgtEl>
-                                          <p:spTgt spid="3">
-                                            <p:txEl>
-                                              <p:pRg st="3" end="3"/>
-                                            </p:txEl>
-                                          </p:spTgt>
-                                        </p:tgtEl>
-                                        <p:attrNameLst>
-                                          <p:attrName>style.visibility</p:attrName>
-                                        </p:attrNameLst>
-                                      </p:cBhvr>
-                                      <p:to>
-                                        <p:strVal val="visible"/>
-                                      </p:to>
-                                    </p:set>
-                                    <p:animEffect transition="in" filter="fade">
-                                      <p:cBhvr>
-                                        <p:cTn id="22" dur="500"/>
-                                        <p:tgtEl>
-                                          <p:spTgt spid="3">
-                                            <p:txEl>
-                                              <p:pRg st="3" end="3"/>
-                                            </p:txEl>
-                                          </p:spTgt>
-                                        </p:tgtEl>
-                                      </p:cBhvr>
-                                    </p:animEffect>
-                                  </p:childTnLst>
-                                </p:cTn>
-                              </p:par>
-                            </p:childTnLst>
-                          </p:cTn>
-                        </p:par>
-                      </p:childTnLst>
-                    </p:cTn>
-                  </p:par>
-                  <p:par>
-                    <p:cTn id="23" fill="hold">
-                      <p:stCondLst>
-                        <p:cond delay="indefinite"/>
-                      </p:stCondLst>
-                      <p:childTnLst>
-                        <p:par>
-                          <p:cTn id="24" fill="hold">
-                            <p:stCondLst>
-                              <p:cond delay="0"/>
-                            </p:stCondLst>
-                            <p:childTnLst>
-                              <p:par>
-                                <p:cTn id="25" presetID="10" presetClass="entr" presetSubtype="0" fill="hold" nodeType="clickEffect">
-                                  <p:stCondLst>
-                                    <p:cond delay="0"/>
-                                  </p:stCondLst>
-                                  <p:childTnLst>
-                                    <p:set>
-                                      <p:cBhvr>
-                                        <p:cTn id="26" dur="1" fill="hold">
-                                          <p:stCondLst>
-                                            <p:cond delay="0"/>
-                                          </p:stCondLst>
-                                        </p:cTn>
-                                        <p:tgtEl>
-                                          <p:spTgt spid="3">
-                                            <p:txEl>
-                                              <p:pRg st="4" end="4"/>
-                                            </p:txEl>
-                                          </p:spTgt>
-                                        </p:tgtEl>
-                                        <p:attrNameLst>
-                                          <p:attrName>style.visibility</p:attrName>
-                                        </p:attrNameLst>
-                                      </p:cBhvr>
-                                      <p:to>
-                                        <p:strVal val="visible"/>
-                                      </p:to>
-                                    </p:set>
-                                    <p:animEffect transition="in" filter="fade">
-                                      <p:cBhvr>
-                                        <p:cTn id="27" dur="500"/>
-                                        <p:tgtEl>
-                                          <p:spTgt spid="3">
-                                            <p:txEl>
-                                              <p:pRg st="4" end="4"/>
-                                            </p:txEl>
-                                          </p:spTgt>
-                                        </p:tgtEl>
-                                      </p:cBhvr>
-                                    </p:animEffect>
-                                  </p:childTnLst>
-                                </p:cTn>
-                              </p:par>
-                            </p:childTnLst>
-                          </p:cTn>
-                        </p:par>
-                      </p:childTnLst>
-                    </p:cTn>
-                  </p:par>
-                  <p:par>
-                    <p:cTn id="28" fill="hold">
-                      <p:stCondLst>
-                        <p:cond delay="indefinite"/>
-                      </p:stCondLst>
-                      <p:childTnLst>
-                        <p:par>
-                          <p:cTn id="29" fill="hold">
-                            <p:stCondLst>
-                              <p:cond delay="0"/>
-                            </p:stCondLst>
-                            <p:childTnLst>
-                              <p:par>
-                                <p:cTn id="30" presetID="10" presetClass="entr" presetSubtype="0" fill="hold" nodeType="clickEffect">
-                                  <p:stCondLst>
-                                    <p:cond delay="0"/>
-                                  </p:stCondLst>
-                                  <p:childTnLst>
-                                    <p:set>
-                                      <p:cBhvr>
-                                        <p:cTn id="31" dur="1" fill="hold">
-                                          <p:stCondLst>
-                                            <p:cond delay="0"/>
-                                          </p:stCondLst>
-                                        </p:cTn>
-                                        <p:tgtEl>
-                                          <p:spTgt spid="3">
-                                            <p:txEl>
-                                              <p:pRg st="5" end="5"/>
-                                            </p:txEl>
-                                          </p:spTgt>
-                                        </p:tgtEl>
-                                        <p:attrNameLst>
-                                          <p:attrName>style.visibility</p:attrName>
-                                        </p:attrNameLst>
-                                      </p:cBhvr>
-                                      <p:to>
-                                        <p:strVal val="visible"/>
-                                      </p:to>
-                                    </p:set>
-                                    <p:animEffect transition="in" filter="fade">
-                                      <p:cBhvr>
-                                        <p:cTn id="32" dur="500"/>
-                                        <p:tgtEl>
-                                          <p:spTgt spid="3">
-                                            <p:txEl>
-                                              <p:pRg st="5" end="5"/>
-                                            </p:txEl>
-                                          </p:spTgt>
-                                        </p:tgtEl>
-                                      </p:cBhvr>
-                                    </p:animEffect>
-                                  </p:childTnLst>
-                                </p:cTn>
-                              </p:par>
-                            </p:childTnLst>
-                          </p:cTn>
-                        </p:par>
-                      </p:childTnLst>
-                    </p:cTn>
-                  </p:par>
-                  <p:par>
-                    <p:cTn id="33" fill="hold">
-                      <p:stCondLst>
-                        <p:cond delay="indefinite"/>
-                      </p:stCondLst>
-                      <p:childTnLst>
-                        <p:par>
-                          <p:cTn id="34" fill="hold">
-                            <p:stCondLst>
-                              <p:cond delay="0"/>
-                            </p:stCondLst>
-                            <p:childTnLst>
-                              <p:par>
-                                <p:cTn id="35" presetID="10" presetClass="entr" presetSubtype="0" fill="hold" nodeType="clickEffect">
-                                  <p:stCondLst>
-                                    <p:cond delay="0"/>
-                                  </p:stCondLst>
-                                  <p:childTnLst>
-                                    <p:set>
-                                      <p:cBhvr>
-                                        <p:cTn id="36" dur="1" fill="hold">
-                                          <p:stCondLst>
-                                            <p:cond delay="0"/>
-                                          </p:stCondLst>
-                                        </p:cTn>
-                                        <p:tgtEl>
-                                          <p:spTgt spid="3">
-                                            <p:txEl>
-                                              <p:pRg st="6" end="6"/>
-                                            </p:txEl>
-                                          </p:spTgt>
-                                        </p:tgtEl>
-                                        <p:attrNameLst>
-                                          <p:attrName>style.visibility</p:attrName>
-                                        </p:attrNameLst>
-                                      </p:cBhvr>
-                                      <p:to>
-                                        <p:strVal val="visible"/>
-                                      </p:to>
-                                    </p:set>
-                                    <p:animEffect transition="in" filter="fade">
-                                      <p:cBhvr>
-                                        <p:cTn id="37" dur="500"/>
-                                        <p:tgtEl>
-                                          <p:spTgt spid="3">
-                                            <p:txEl>
-                                              <p:pRg st="6" end="6"/>
-                                            </p:txEl>
-                                          </p:spTgt>
-                                        </p:tgtEl>
-                                      </p:cBhvr>
-                                    </p:animEffect>
-                                  </p:childTnLst>
-                                </p:cTn>
-                              </p:par>
-                            </p:childTnLst>
-                          </p:cTn>
-                        </p:par>
-                      </p:childTnLst>
-                    </p:cTn>
-                  </p:par>
-                  <p:par>
-                    <p:cTn id="38" fill="hold">
-                      <p:stCondLst>
-                        <p:cond delay="indefinite"/>
-                      </p:stCondLst>
-                      <p:childTnLst>
-                        <p:par>
-                          <p:cTn id="39" fill="hold">
-                            <p:stCondLst>
-                              <p:cond delay="0"/>
-                            </p:stCondLst>
-                            <p:childTnLst>
-                              <p:par>
-                                <p:cTn id="40" presetID="10" presetClass="entr" presetSubtype="0" fill="hold" nodeType="clickEffect">
-                                  <p:stCondLst>
-                                    <p:cond delay="0"/>
-                                  </p:stCondLst>
-                                  <p:childTnLst>
-                                    <p:set>
-                                      <p:cBhvr>
-                                        <p:cTn id="41" dur="1" fill="hold">
-                                          <p:stCondLst>
-                                            <p:cond delay="0"/>
-                                          </p:stCondLst>
-                                        </p:cTn>
-                                        <p:tgtEl>
-                                          <p:spTgt spid="3">
-                                            <p:txEl>
-                                              <p:pRg st="7" end="7"/>
-                                            </p:txEl>
-                                          </p:spTgt>
-                                        </p:tgtEl>
-                                        <p:attrNameLst>
-                                          <p:attrName>style.visibility</p:attrName>
-                                        </p:attrNameLst>
-                                      </p:cBhvr>
-                                      <p:to>
-                                        <p:strVal val="visible"/>
-                                      </p:to>
-                                    </p:set>
-                                    <p:animEffect transition="in" filter="fade">
-                                      <p:cBhvr>
-                                        <p:cTn id="42" dur="500"/>
-                                        <p:tgtEl>
-                                          <p:spTgt spid="3">
-                                            <p:txEl>
-                                              <p:pRg st="7" end="7"/>
-                                            </p:txEl>
-                                          </p:spTgt>
-                                        </p:tgtEl>
-                                      </p:cBhvr>
-                                    </p:animEffect>
-                                  </p:childTnLst>
-                                </p:cTn>
-                              </p:par>
-                            </p:childTnLst>
-                          </p:cTn>
-                        </p:par>
-                      </p:childTnLst>
-                    </p:cTn>
-                  </p:par>
-                  <p:par>
-                    <p:cTn id="43" fill="hold">
-                      <p:stCondLst>
-                        <p:cond delay="indefinite"/>
-                      </p:stCondLst>
-                      <p:childTnLst>
-                        <p:par>
-                          <p:cTn id="44" fill="hold">
-                            <p:stCondLst>
-                              <p:cond delay="0"/>
-                            </p:stCondLst>
-                            <p:childTnLst>
-                              <p:par>
-                                <p:cTn id="45" presetID="10" presetClass="entr" presetSubtype="0" fill="hold" nodeType="clickEffect">
-                                  <p:stCondLst>
-                                    <p:cond delay="0"/>
-                                  </p:stCondLst>
-                                  <p:childTnLst>
-                                    <p:set>
-                                      <p:cBhvr>
-                                        <p:cTn id="46" dur="1" fill="hold">
-                                          <p:stCondLst>
-                                            <p:cond delay="0"/>
-                                          </p:stCondLst>
-                                        </p:cTn>
-                                        <p:tgtEl>
-                                          <p:spTgt spid="3">
-                                            <p:txEl>
-                                              <p:pRg st="8" end="8"/>
-                                            </p:txEl>
-                                          </p:spTgt>
-                                        </p:tgtEl>
-                                        <p:attrNameLst>
-                                          <p:attrName>style.visibility</p:attrName>
-                                        </p:attrNameLst>
-                                      </p:cBhvr>
-                                      <p:to>
-                                        <p:strVal val="visible"/>
-                                      </p:to>
-                                    </p:set>
-                                    <p:animEffect transition="in" filter="fade">
-                                      <p:cBhvr>
-                                        <p:cTn id="47" dur="500"/>
-                                        <p:tgtEl>
-                                          <p:spTgt spid="3">
-                                            <p:txEl>
-                                              <p:pRg st="8" end="8"/>
-                                            </p:txEl>
-                                          </p:spTgt>
-                                        </p:tgtEl>
-                                      </p:cBhvr>
-                                    </p:animEffect>
-                                  </p:childTnLst>
-                                </p:cTn>
-                              </p:par>
-                            </p:childTnLst>
-                          </p:cTn>
-                        </p:par>
-                      </p:childTnLst>
-                    </p:cTn>
-                  </p:par>
-                </p:childTnLst>
-              </p:cTn>
-              <p:prevCondLst>
-                <p:cond evt="onPrev" delay="0">
-                  <p:tgtEl>
-                    <p:sldTgt/>
-                  </p:tgtEl>
-                </p:cond>
-              </p:prevCondLst>
-              <p:nextCondLst>
-                <p:cond evt="onNext" delay="0">
-                  <p:tgtEl>
-                    <p:sldTgt/>
-                  </p:tgtEl>
-                </p:cond>
-              </p:nextCondLst>
-            </p:seq>
-          </p:childTnLst>
-        </p:cTn>
-      </p:par>
-    </p:tnLst>
-  </p:timing>
-</p:sld>
-</file>
-
-<file path=ppt/slides/slide20.xml><?xml version="1.0" encoding="utf-8"?>
+<file path=ppt/slides/slide21.xml><?xml version="1.0" encoding="utf-8"?>
 <p:sld xmlns:a="http://schemas.openxmlformats.org/drawingml/2006/main" xmlns:r="http://schemas.openxmlformats.org/officeDocument/2006/relationships" xmlns:p="http://schemas.openxmlformats.org/presentationml/2006/main">
   <p:cSld>
     <p:spTree>
@@ -14549,7 +15608,7 @@
 </p:sld>
 </file>
 
-<file path=ppt/slides/slide21.xml><?xml version="1.0" encoding="utf-8"?>
+<file path=ppt/slides/slide22.xml><?xml version="1.0" encoding="utf-8"?>
 <p:sld xmlns:a="http://schemas.openxmlformats.org/drawingml/2006/main" xmlns:r="http://schemas.openxmlformats.org/officeDocument/2006/relationships" xmlns:p="http://schemas.openxmlformats.org/presentationml/2006/main">
   <p:cSld>
     <p:spTree>
@@ -14733,6 +15792,174 @@
           <a:lstStyle/>
           <a:p>
             <a:r>
+              <a:rPr lang="en-US" dirty="0" smtClean="0"/>
+              <a:t>A Real-World Example</a:t>
+            </a:r>
+            <a:endParaRPr lang="en-US" dirty="0"/>
+          </a:p>
+        </p:txBody>
+      </p:sp>
+      <p:pic>
+        <p:nvPicPr>
+          <p:cNvPr id="4" name="Content Placeholder 3"/>
+          <p:cNvPicPr>
+            <a:picLocks noGrp="1" noChangeAspect="1"/>
+          </p:cNvPicPr>
+          <p:nvPr>
+            <p:ph idx="1"/>
+          </p:nvPr>
+        </p:nvPicPr>
+        <p:blipFill>
+          <a:blip r:embed="rId2">
+            <a:extLst>
+              <a:ext uri="{28A0092B-C50C-407E-A947-70E740481C1C}">
+                <a14:useLocalDpi xmlns:a14="http://schemas.microsoft.com/office/drawing/2010/main" val="0"/>
+              </a:ext>
+            </a:extLst>
+          </a:blip>
+          <a:stretch>
+            <a:fillRect/>
+          </a:stretch>
+        </p:blipFill>
+        <p:spPr>
+          <a:xfrm>
+            <a:off x="674786" y="1752601"/>
+            <a:ext cx="6777781" cy="5164024"/>
+          </a:xfrm>
+        </p:spPr>
+      </p:pic>
+    </p:spTree>
+    <p:extLst>
+      <p:ext uri="{BB962C8B-B14F-4D97-AF65-F5344CB8AC3E}">
+        <p14:creationId xmlns:p14="http://schemas.microsoft.com/office/powerpoint/2010/main" val="2665490816"/>
+      </p:ext>
+    </p:extLst>
+  </p:cSld>
+  <p:clrMapOvr>
+    <a:masterClrMapping/>
+  </p:clrMapOvr>
+  <p:transition spd="med">
+    <p:fade/>
+  </p:transition>
+  <p:timing>
+    <p:tnLst>
+      <p:par>
+        <p:cTn id="1" dur="indefinite" restart="never" nodeType="tmRoot">
+          <p:childTnLst>
+            <p:seq concurrent="1" nextAc="seek">
+              <p:cTn id="2" dur="indefinite" nodeType="mainSeq">
+                <p:childTnLst>
+                  <p:par>
+                    <p:cTn id="3" fill="hold">
+                      <p:stCondLst>
+                        <p:cond delay="indefinite"/>
+                      </p:stCondLst>
+                      <p:childTnLst>
+                        <p:par>
+                          <p:cTn id="4" fill="hold">
+                            <p:stCondLst>
+                              <p:cond delay="0"/>
+                            </p:stCondLst>
+                            <p:childTnLst>
+                              <p:par>
+                                <p:cTn id="5" presetID="10" presetClass="entr" presetSubtype="0" fill="hold" nodeType="clickEffect">
+                                  <p:stCondLst>
+                                    <p:cond delay="0"/>
+                                  </p:stCondLst>
+                                  <p:childTnLst>
+                                    <p:set>
+                                      <p:cBhvr>
+                                        <p:cTn id="6" dur="1" fill="hold">
+                                          <p:stCondLst>
+                                            <p:cond delay="0"/>
+                                          </p:stCondLst>
+                                        </p:cTn>
+                                        <p:tgtEl>
+                                          <p:spTgt spid="4"/>
+                                        </p:tgtEl>
+                                        <p:attrNameLst>
+                                          <p:attrName>style.visibility</p:attrName>
+                                        </p:attrNameLst>
+                                      </p:cBhvr>
+                                      <p:to>
+                                        <p:strVal val="visible"/>
+                                      </p:to>
+                                    </p:set>
+                                    <p:animEffect transition="in" filter="fade">
+                                      <p:cBhvr>
+                                        <p:cTn id="7" dur="500"/>
+                                        <p:tgtEl>
+                                          <p:spTgt spid="4"/>
+                                        </p:tgtEl>
+                                      </p:cBhvr>
+                                    </p:animEffect>
+                                  </p:childTnLst>
+                                </p:cTn>
+                              </p:par>
+                            </p:childTnLst>
+                          </p:cTn>
+                        </p:par>
+                      </p:childTnLst>
+                    </p:cTn>
+                  </p:par>
+                </p:childTnLst>
+              </p:cTn>
+              <p:prevCondLst>
+                <p:cond evt="onPrev" delay="0">
+                  <p:tgtEl>
+                    <p:sldTgt/>
+                  </p:tgtEl>
+                </p:cond>
+              </p:prevCondLst>
+              <p:nextCondLst>
+                <p:cond evt="onNext" delay="0">
+                  <p:tgtEl>
+                    <p:sldTgt/>
+                  </p:tgtEl>
+                </p:cond>
+              </p:nextCondLst>
+            </p:seq>
+          </p:childTnLst>
+        </p:cTn>
+      </p:par>
+    </p:tnLst>
+  </p:timing>
+</p:sld>
+</file>
+
+<file path=ppt/slides/slide4.xml><?xml version="1.0" encoding="utf-8"?>
+<p:sld xmlns:a="http://schemas.openxmlformats.org/drawingml/2006/main" xmlns:r="http://schemas.openxmlformats.org/officeDocument/2006/relationships" xmlns:p="http://schemas.openxmlformats.org/presentationml/2006/main">
+  <p:cSld>
+    <p:spTree>
+      <p:nvGrpSpPr>
+        <p:cNvPr id="1" name=""/>
+        <p:cNvGrpSpPr/>
+        <p:nvPr/>
+      </p:nvGrpSpPr>
+      <p:grpSpPr>
+        <a:xfrm>
+          <a:off x="0" y="0"/>
+          <a:ext cx="0" cy="0"/>
+          <a:chOff x="0" y="0"/>
+          <a:chExt cx="0" cy="0"/>
+        </a:xfrm>
+      </p:grpSpPr>
+      <p:sp>
+        <p:nvSpPr>
+          <p:cNvPr id="2" name="Title 1"/>
+          <p:cNvSpPr>
+            <a:spLocks noGrp="1"/>
+          </p:cNvSpPr>
+          <p:nvPr>
+            <p:ph type="title"/>
+          </p:nvPr>
+        </p:nvSpPr>
+        <p:spPr/>
+        <p:txBody>
+          <a:bodyPr/>
+          <a:lstStyle/>
+          <a:p>
+            <a:r>
               <a:rPr lang="en-US" dirty="0"/>
               <a:t>The Box-and-Whisker Plot</a:t>
             </a:r>
@@ -15897,7 +17124,7 @@
 </p:sld>
 </file>
 
-<file path=ppt/slides/slide4.xml><?xml version="1.0" encoding="utf-8"?>
+<file path=ppt/slides/slide5.xml><?xml version="1.0" encoding="utf-8"?>
 <p:sld xmlns:a="http://schemas.openxmlformats.org/drawingml/2006/main" xmlns:r="http://schemas.openxmlformats.org/officeDocument/2006/relationships" xmlns:p="http://schemas.openxmlformats.org/presentationml/2006/main">
   <p:cSld>
     <p:spTree>
@@ -16413,7 +17640,7 @@
 </p:sld>
 </file>
 
-<file path=ppt/slides/slide5.xml><?xml version="1.0" encoding="utf-8"?>
+<file path=ppt/slides/slide6.xml><?xml version="1.0" encoding="utf-8"?>
 <p:sld xmlns:a="http://schemas.openxmlformats.org/drawingml/2006/main" xmlns:r="http://schemas.openxmlformats.org/officeDocument/2006/relationships" xmlns:p="http://schemas.openxmlformats.org/presentationml/2006/main">
   <p:cSld>
     <p:spTree>
@@ -16799,7 +18026,7 @@
 </p:sld>
 </file>
 
-<file path=ppt/slides/slide6.xml><?xml version="1.0" encoding="utf-8"?>
+<file path=ppt/slides/slide7.xml><?xml version="1.0" encoding="utf-8"?>
 <p:sld xmlns:a="http://schemas.openxmlformats.org/drawingml/2006/main" xmlns:r="http://schemas.openxmlformats.org/officeDocument/2006/relationships" xmlns:p="http://schemas.openxmlformats.org/presentationml/2006/main">
   <p:cSld>
     <p:spTree>
@@ -17675,7 +18902,7 @@
 </p:sld>
 </file>
 
-<file path=ppt/slides/slide7.xml><?xml version="1.0" encoding="utf-8"?>
+<file path=ppt/slides/slide8.xml><?xml version="1.0" encoding="utf-8"?>
 <p:sld xmlns:a="http://schemas.openxmlformats.org/drawingml/2006/main" xmlns:r="http://schemas.openxmlformats.org/officeDocument/2006/relationships" xmlns:p="http://schemas.openxmlformats.org/presentationml/2006/main">
   <p:cSld>
     <p:spTree>
@@ -18003,7 +19230,7 @@
 </p:sld>
 </file>
 
-<file path=ppt/slides/slide8.xml><?xml version="1.0" encoding="utf-8"?>
+<file path=ppt/slides/slide9.xml><?xml version="1.0" encoding="utf-8"?>
 <p:sld xmlns:a="http://schemas.openxmlformats.org/drawingml/2006/main" xmlns:r="http://schemas.openxmlformats.org/officeDocument/2006/relationships" xmlns:p="http://schemas.openxmlformats.org/presentationml/2006/main">
   <p:cSld>
     <p:spTree>
@@ -18596,1056 +19823,6 @@
         </p:cTn>
       </p:par>
     </p:tnLst>
-  </p:timing>
-</p:sld>
-</file>
-
-<file path=ppt/slides/slide9.xml><?xml version="1.0" encoding="utf-8"?>
-<p:sld xmlns:a="http://schemas.openxmlformats.org/drawingml/2006/main" xmlns:r="http://schemas.openxmlformats.org/officeDocument/2006/relationships" xmlns:p="http://schemas.openxmlformats.org/presentationml/2006/main">
-  <p:cSld>
-    <p:spTree>
-      <p:nvGrpSpPr>
-        <p:cNvPr id="1" name=""/>
-        <p:cNvGrpSpPr/>
-        <p:nvPr/>
-      </p:nvGrpSpPr>
-      <p:grpSpPr>
-        <a:xfrm>
-          <a:off x="0" y="0"/>
-          <a:ext cx="0" cy="0"/>
-          <a:chOff x="0" y="0"/>
-          <a:chExt cx="0" cy="0"/>
-        </a:xfrm>
-      </p:grpSpPr>
-      <p:sp>
-        <p:nvSpPr>
-          <p:cNvPr id="2" name="Title 1"/>
-          <p:cNvSpPr>
-            <a:spLocks noGrp="1"/>
-          </p:cNvSpPr>
-          <p:nvPr>
-            <p:ph type="title"/>
-          </p:nvPr>
-        </p:nvSpPr>
-        <p:spPr/>
-        <p:txBody>
-          <a:bodyPr>
-            <a:normAutofit/>
-          </a:bodyPr>
-          <a:lstStyle/>
-          <a:p>
-            <a:r>
-              <a:rPr lang="en-US" dirty="0" smtClean="0"/>
-              <a:t>Descriptive Statistics</a:t>
-            </a:r>
-            <a:endParaRPr lang="en-US" dirty="0"/>
-          </a:p>
-        </p:txBody>
-      </p:sp>
-      <p:pic>
-        <p:nvPicPr>
-          <p:cNvPr id="5" name="Content Placeholder 4"/>
-          <p:cNvPicPr>
-            <a:picLocks noGrp="1" noChangeAspect="1"/>
-          </p:cNvPicPr>
-          <p:nvPr>
-            <p:ph sz="half" idx="1"/>
-          </p:nvPr>
-        </p:nvPicPr>
-        <p:blipFill>
-          <a:blip r:embed="rId2" cstate="print">
-            <a:extLst>
-              <a:ext uri="{28A0092B-C50C-407E-A947-70E740481C1C}">
-                <a14:useLocalDpi xmlns:a14="http://schemas.microsoft.com/office/drawing/2010/main" val="0"/>
-              </a:ext>
-            </a:extLst>
-          </a:blip>
-          <a:stretch>
-            <a:fillRect/>
-          </a:stretch>
-        </p:blipFill>
-        <p:spPr>
-          <a:xfrm>
-            <a:off x="45987" y="2286000"/>
-            <a:ext cx="5288013" cy="4028961"/>
-          </a:xfrm>
-        </p:spPr>
-      </p:pic>
-      <p:sp>
-        <p:nvSpPr>
-          <p:cNvPr id="4" name="Content Placeholder 3"/>
-          <p:cNvSpPr>
-            <a:spLocks noGrp="1"/>
-          </p:cNvSpPr>
-          <p:nvPr>
-            <p:ph sz="half" idx="2"/>
-          </p:nvPr>
-        </p:nvSpPr>
-        <p:spPr>
-          <a:xfrm>
-            <a:off x="5257800" y="1920085"/>
-            <a:ext cx="3429000" cy="4434840"/>
-          </a:xfrm>
-        </p:spPr>
-        <p:txBody>
-          <a:bodyPr/>
-          <a:lstStyle/>
-          <a:p>
-            <a:r>
-              <a:rPr lang="en-US" dirty="0" smtClean="0"/>
-              <a:t>Range is already present</a:t>
-            </a:r>
-          </a:p>
-          <a:p>
-            <a:r>
-              <a:rPr lang="en-US" dirty="0" smtClean="0"/>
-              <a:t>What about quartiles?</a:t>
-            </a:r>
-          </a:p>
-          <a:p>
-            <a:r>
-              <a:rPr lang="en-US" dirty="0" smtClean="0"/>
-              <a:t>Not really elegant</a:t>
-            </a:r>
-          </a:p>
-          <a:p>
-            <a:r>
-              <a:rPr lang="en-US" dirty="0" smtClean="0"/>
-              <a:t>And what about the mean?</a:t>
-            </a:r>
-          </a:p>
-        </p:txBody>
-      </p:sp>
-      <p:sp>
-        <p:nvSpPr>
-          <p:cNvPr id="6" name="Right Brace 5"/>
-          <p:cNvSpPr/>
-          <p:nvPr/>
-        </p:nvSpPr>
-        <p:spPr>
-          <a:xfrm>
-            <a:off x="3048000" y="2590800"/>
-            <a:ext cx="1295400" cy="2895600"/>
-          </a:xfrm>
-          <a:prstGeom prst="rightBrace">
-            <a:avLst/>
-          </a:prstGeom>
-          <a:ln w="15875"/>
-        </p:spPr>
-        <p:style>
-          <a:lnRef idx="1">
-            <a:schemeClr val="accent1"/>
-          </a:lnRef>
-          <a:fillRef idx="0">
-            <a:schemeClr val="accent1"/>
-          </a:fillRef>
-          <a:effectRef idx="0">
-            <a:schemeClr val="accent1"/>
-          </a:effectRef>
-          <a:fontRef idx="minor">
-            <a:schemeClr val="tx1"/>
-          </a:fontRef>
-        </p:style>
-        <p:txBody>
-          <a:bodyPr rtlCol="0" anchor="ctr"/>
-          <a:lstStyle/>
-          <a:p>
-            <a:pPr algn="ctr"/>
-            <a:endParaRPr lang="en-US"/>
-          </a:p>
-        </p:txBody>
-      </p:sp>
-      <p:sp>
-        <p:nvSpPr>
-          <p:cNvPr id="7" name="TextBox 6"/>
-          <p:cNvSpPr txBox="1"/>
-          <p:nvPr/>
-        </p:nvSpPr>
-        <p:spPr>
-          <a:xfrm>
-            <a:off x="1676400" y="3853934"/>
-            <a:ext cx="533400" cy="369332"/>
-          </a:xfrm>
-          <a:prstGeom prst="rect">
-            <a:avLst/>
-          </a:prstGeom>
-          <a:noFill/>
-        </p:spPr>
-        <p:txBody>
-          <a:bodyPr wrap="square" rtlCol="0">
-            <a:spAutoFit/>
-          </a:bodyPr>
-          <a:lstStyle/>
-          <a:p>
-            <a:r>
-              <a:rPr lang="en-US" b="1" dirty="0" smtClean="0">
-                <a:solidFill>
-                  <a:schemeClr val="accent1">
-                    <a:lumMod val="50000"/>
-                  </a:schemeClr>
-                </a:solidFill>
-              </a:rPr>
-              <a:t>3</a:t>
-            </a:r>
-            <a:r>
-              <a:rPr lang="en-US" b="1" baseline="30000" dirty="0" smtClean="0">
-                <a:solidFill>
-                  <a:schemeClr val="accent1">
-                    <a:lumMod val="50000"/>
-                  </a:schemeClr>
-                </a:solidFill>
-              </a:rPr>
-              <a:t>rd</a:t>
-            </a:r>
-            <a:endParaRPr lang="en-US" b="1" dirty="0">
-              <a:solidFill>
-                <a:schemeClr val="accent1">
-                  <a:lumMod val="50000"/>
-                </a:schemeClr>
-              </a:solidFill>
-            </a:endParaRPr>
-          </a:p>
-        </p:txBody>
-      </p:sp>
-      <p:cxnSp>
-        <p:nvCxnSpPr>
-          <p:cNvPr id="9" name="Straight Arrow Connector 8"/>
-          <p:cNvCxnSpPr/>
-          <p:nvPr/>
-        </p:nvCxnSpPr>
-        <p:spPr>
-          <a:xfrm>
-            <a:off x="2209800" y="4038600"/>
-            <a:ext cx="533400" cy="228600"/>
-          </a:xfrm>
-          <a:prstGeom prst="straightConnector1">
-            <a:avLst/>
-          </a:prstGeom>
-          <a:ln w="15875">
-            <a:tailEnd type="arrow"/>
-          </a:ln>
-        </p:spPr>
-        <p:style>
-          <a:lnRef idx="1">
-            <a:schemeClr val="accent1"/>
-          </a:lnRef>
-          <a:fillRef idx="0">
-            <a:schemeClr val="accent1"/>
-          </a:fillRef>
-          <a:effectRef idx="0">
-            <a:schemeClr val="accent1"/>
-          </a:effectRef>
-          <a:fontRef idx="minor">
-            <a:schemeClr val="tx1"/>
-          </a:fontRef>
-        </p:style>
-      </p:cxnSp>
-      <p:sp>
-        <p:nvSpPr>
-          <p:cNvPr id="13" name="TextBox 12"/>
-          <p:cNvSpPr txBox="1"/>
-          <p:nvPr/>
-        </p:nvSpPr>
-        <p:spPr>
-          <a:xfrm>
-            <a:off x="1714500" y="5110639"/>
-            <a:ext cx="457200" cy="369332"/>
-          </a:xfrm>
-          <a:prstGeom prst="rect">
-            <a:avLst/>
-          </a:prstGeom>
-          <a:noFill/>
-        </p:spPr>
-        <p:txBody>
-          <a:bodyPr wrap="square" rtlCol="0">
-            <a:spAutoFit/>
-          </a:bodyPr>
-          <a:lstStyle/>
-          <a:p>
-            <a:r>
-              <a:rPr lang="en-US" b="1" dirty="0" smtClean="0">
-                <a:solidFill>
-                  <a:schemeClr val="accent1">
-                    <a:lumMod val="50000"/>
-                  </a:schemeClr>
-                </a:solidFill>
-              </a:rPr>
-              <a:t>1</a:t>
-            </a:r>
-            <a:r>
-              <a:rPr lang="en-US" b="1" baseline="30000" dirty="0" smtClean="0">
-                <a:solidFill>
-                  <a:schemeClr val="accent1">
-                    <a:lumMod val="50000"/>
-                  </a:schemeClr>
-                </a:solidFill>
-              </a:rPr>
-              <a:t>st</a:t>
-            </a:r>
-            <a:endParaRPr lang="en-US" b="1" dirty="0">
-              <a:solidFill>
-                <a:schemeClr val="accent1">
-                  <a:lumMod val="50000"/>
-                </a:schemeClr>
-              </a:solidFill>
-            </a:endParaRPr>
-          </a:p>
-        </p:txBody>
-      </p:sp>
-      <p:sp>
-        <p:nvSpPr>
-          <p:cNvPr id="14" name="TextBox 13"/>
-          <p:cNvSpPr txBox="1"/>
-          <p:nvPr/>
-        </p:nvSpPr>
-        <p:spPr>
-          <a:xfrm>
-            <a:off x="1219200" y="4419600"/>
-            <a:ext cx="1257300" cy="369332"/>
-          </a:xfrm>
-          <a:prstGeom prst="rect">
-            <a:avLst/>
-          </a:prstGeom>
-          <a:noFill/>
-        </p:spPr>
-        <p:txBody>
-          <a:bodyPr wrap="square" rtlCol="0">
-            <a:spAutoFit/>
-          </a:bodyPr>
-          <a:lstStyle/>
-          <a:p>
-            <a:r>
-              <a:rPr lang="en-US" b="1" dirty="0" smtClean="0">
-                <a:solidFill>
-                  <a:schemeClr val="accent1">
-                    <a:lumMod val="50000"/>
-                  </a:schemeClr>
-                </a:solidFill>
-              </a:rPr>
-              <a:t>Median</a:t>
-            </a:r>
-            <a:endParaRPr lang="en-US" b="1" dirty="0">
-              <a:solidFill>
-                <a:schemeClr val="accent1">
-                  <a:lumMod val="50000"/>
-                </a:schemeClr>
-              </a:solidFill>
-            </a:endParaRPr>
-          </a:p>
-        </p:txBody>
-      </p:sp>
-      <p:cxnSp>
-        <p:nvCxnSpPr>
-          <p:cNvPr id="15" name="Straight Arrow Connector 14"/>
-          <p:cNvCxnSpPr>
-            <a:stCxn id="13" idx="3"/>
-          </p:cNvCxnSpPr>
-          <p:nvPr/>
-        </p:nvCxnSpPr>
-        <p:spPr>
-          <a:xfrm flipV="1">
-            <a:off x="2171700" y="5029200"/>
-            <a:ext cx="571500" cy="266105"/>
-          </a:xfrm>
-          <a:prstGeom prst="straightConnector1">
-            <a:avLst/>
-          </a:prstGeom>
-          <a:ln w="15875">
-            <a:tailEnd type="arrow"/>
-          </a:ln>
-        </p:spPr>
-        <p:style>
-          <a:lnRef idx="1">
-            <a:schemeClr val="accent1"/>
-          </a:lnRef>
-          <a:fillRef idx="0">
-            <a:schemeClr val="accent1"/>
-          </a:fillRef>
-          <a:effectRef idx="0">
-            <a:schemeClr val="accent1"/>
-          </a:effectRef>
-          <a:fontRef idx="minor">
-            <a:schemeClr val="tx1"/>
-          </a:fontRef>
-        </p:style>
-      </p:cxnSp>
-      <p:cxnSp>
-        <p:nvCxnSpPr>
-          <p:cNvPr id="18" name="Straight Arrow Connector 17"/>
-          <p:cNvCxnSpPr/>
-          <p:nvPr/>
-        </p:nvCxnSpPr>
-        <p:spPr>
-          <a:xfrm>
-            <a:off x="2209800" y="4604266"/>
-            <a:ext cx="533400" cy="0"/>
-          </a:xfrm>
-          <a:prstGeom prst="straightConnector1">
-            <a:avLst/>
-          </a:prstGeom>
-          <a:ln w="15875">
-            <a:tailEnd type="arrow"/>
-          </a:ln>
-        </p:spPr>
-        <p:style>
-          <a:lnRef idx="1">
-            <a:schemeClr val="accent1"/>
-          </a:lnRef>
-          <a:fillRef idx="0">
-            <a:schemeClr val="accent1"/>
-          </a:fillRef>
-          <a:effectRef idx="0">
-            <a:schemeClr val="accent1"/>
-          </a:effectRef>
-          <a:fontRef idx="minor">
-            <a:schemeClr val="tx1"/>
-          </a:fontRef>
-        </p:style>
-      </p:cxnSp>
-    </p:spTree>
-    <p:extLst>
-      <p:ext uri="{BB962C8B-B14F-4D97-AF65-F5344CB8AC3E}">
-        <p14:creationId xmlns:p14="http://schemas.microsoft.com/office/powerpoint/2010/main" val="2532616962"/>
-      </p:ext>
-    </p:extLst>
-  </p:cSld>
-  <p:clrMapOvr>
-    <a:masterClrMapping/>
-  </p:clrMapOvr>
-  <p:transition spd="med">
-    <p:fade/>
-  </p:transition>
-  <p:timing>
-    <p:tnLst>
-      <p:par>
-        <p:cTn id="1" dur="indefinite" restart="never" nodeType="tmRoot">
-          <p:childTnLst>
-            <p:seq concurrent="1" nextAc="seek">
-              <p:cTn id="2" dur="indefinite" nodeType="mainSeq">
-                <p:childTnLst>
-                  <p:par>
-                    <p:cTn id="3" fill="hold">
-                      <p:stCondLst>
-                        <p:cond delay="indefinite"/>
-                      </p:stCondLst>
-                      <p:childTnLst>
-                        <p:par>
-                          <p:cTn id="4" fill="hold">
-                            <p:stCondLst>
-                              <p:cond delay="0"/>
-                            </p:stCondLst>
-                            <p:childTnLst>
-                              <p:par>
-                                <p:cTn id="5" presetID="10" presetClass="entr" presetSubtype="0" fill="hold" nodeType="clickEffect">
-                                  <p:stCondLst>
-                                    <p:cond delay="0"/>
-                                  </p:stCondLst>
-                                  <p:childTnLst>
-                                    <p:set>
-                                      <p:cBhvr>
-                                        <p:cTn id="6" dur="1" fill="hold">
-                                          <p:stCondLst>
-                                            <p:cond delay="0"/>
-                                          </p:stCondLst>
-                                        </p:cTn>
-                                        <p:tgtEl>
-                                          <p:spTgt spid="5"/>
-                                        </p:tgtEl>
-                                        <p:attrNameLst>
-                                          <p:attrName>style.visibility</p:attrName>
-                                        </p:attrNameLst>
-                                      </p:cBhvr>
-                                      <p:to>
-                                        <p:strVal val="visible"/>
-                                      </p:to>
-                                    </p:set>
-                                    <p:animEffect transition="in" filter="fade">
-                                      <p:cBhvr>
-                                        <p:cTn id="7" dur="500"/>
-                                        <p:tgtEl>
-                                          <p:spTgt spid="5"/>
-                                        </p:tgtEl>
-                                      </p:cBhvr>
-                                    </p:animEffect>
-                                  </p:childTnLst>
-                                </p:cTn>
-                              </p:par>
-                            </p:childTnLst>
-                          </p:cTn>
-                        </p:par>
-                      </p:childTnLst>
-                    </p:cTn>
-                  </p:par>
-                  <p:par>
-                    <p:cTn id="8" fill="hold">
-                      <p:stCondLst>
-                        <p:cond delay="indefinite"/>
-                      </p:stCondLst>
-                      <p:childTnLst>
-                        <p:par>
-                          <p:cTn id="9" fill="hold">
-                            <p:stCondLst>
-                              <p:cond delay="0"/>
-                            </p:stCondLst>
-                            <p:childTnLst>
-                              <p:par>
-                                <p:cTn id="10" presetID="10" presetClass="entr" presetSubtype="0" fill="hold" nodeType="clickEffect">
-                                  <p:stCondLst>
-                                    <p:cond delay="0"/>
-                                  </p:stCondLst>
-                                  <p:childTnLst>
-                                    <p:set>
-                                      <p:cBhvr>
-                                        <p:cTn id="11" dur="1" fill="hold">
-                                          <p:stCondLst>
-                                            <p:cond delay="0"/>
-                                          </p:stCondLst>
-                                        </p:cTn>
-                                        <p:tgtEl>
-                                          <p:spTgt spid="4">
-                                            <p:txEl>
-                                              <p:pRg st="0" end="0"/>
-                                            </p:txEl>
-                                          </p:spTgt>
-                                        </p:tgtEl>
-                                        <p:attrNameLst>
-                                          <p:attrName>style.visibility</p:attrName>
-                                        </p:attrNameLst>
-                                      </p:cBhvr>
-                                      <p:to>
-                                        <p:strVal val="visible"/>
-                                      </p:to>
-                                    </p:set>
-                                    <p:animEffect transition="in" filter="fade">
-                                      <p:cBhvr>
-                                        <p:cTn id="12" dur="500"/>
-                                        <p:tgtEl>
-                                          <p:spTgt spid="4">
-                                            <p:txEl>
-                                              <p:pRg st="0" end="0"/>
-                                            </p:txEl>
-                                          </p:spTgt>
-                                        </p:tgtEl>
-                                      </p:cBhvr>
-                                    </p:animEffect>
-                                  </p:childTnLst>
-                                </p:cTn>
-                              </p:par>
-                              <p:par>
-                                <p:cTn id="13" presetID="10" presetClass="entr" presetSubtype="0" fill="hold" grpId="0" nodeType="withEffect">
-                                  <p:stCondLst>
-                                    <p:cond delay="0"/>
-                                  </p:stCondLst>
-                                  <p:childTnLst>
-                                    <p:set>
-                                      <p:cBhvr>
-                                        <p:cTn id="14" dur="1" fill="hold">
-                                          <p:stCondLst>
-                                            <p:cond delay="0"/>
-                                          </p:stCondLst>
-                                        </p:cTn>
-                                        <p:tgtEl>
-                                          <p:spTgt spid="6"/>
-                                        </p:tgtEl>
-                                        <p:attrNameLst>
-                                          <p:attrName>style.visibility</p:attrName>
-                                        </p:attrNameLst>
-                                      </p:cBhvr>
-                                      <p:to>
-                                        <p:strVal val="visible"/>
-                                      </p:to>
-                                    </p:set>
-                                    <p:animEffect transition="in" filter="fade">
-                                      <p:cBhvr>
-                                        <p:cTn id="15" dur="500"/>
-                                        <p:tgtEl>
-                                          <p:spTgt spid="6"/>
-                                        </p:tgtEl>
-                                      </p:cBhvr>
-                                    </p:animEffect>
-                                  </p:childTnLst>
-                                </p:cTn>
-                              </p:par>
-                            </p:childTnLst>
-                          </p:cTn>
-                        </p:par>
-                      </p:childTnLst>
-                    </p:cTn>
-                  </p:par>
-                  <p:par>
-                    <p:cTn id="16" fill="hold">
-                      <p:stCondLst>
-                        <p:cond delay="indefinite"/>
-                      </p:stCondLst>
-                      <p:childTnLst>
-                        <p:par>
-                          <p:cTn id="17" fill="hold">
-                            <p:stCondLst>
-                              <p:cond delay="0"/>
-                            </p:stCondLst>
-                            <p:childTnLst>
-                              <p:par>
-                                <p:cTn id="18" presetID="10" presetClass="entr" presetSubtype="0" fill="hold" nodeType="clickEffect">
-                                  <p:stCondLst>
-                                    <p:cond delay="0"/>
-                                  </p:stCondLst>
-                                  <p:childTnLst>
-                                    <p:set>
-                                      <p:cBhvr>
-                                        <p:cTn id="19" dur="1" fill="hold">
-                                          <p:stCondLst>
-                                            <p:cond delay="0"/>
-                                          </p:stCondLst>
-                                        </p:cTn>
-                                        <p:tgtEl>
-                                          <p:spTgt spid="4">
-                                            <p:txEl>
-                                              <p:pRg st="1" end="1"/>
-                                            </p:txEl>
-                                          </p:spTgt>
-                                        </p:tgtEl>
-                                        <p:attrNameLst>
-                                          <p:attrName>style.visibility</p:attrName>
-                                        </p:attrNameLst>
-                                      </p:cBhvr>
-                                      <p:to>
-                                        <p:strVal val="visible"/>
-                                      </p:to>
-                                    </p:set>
-                                    <p:animEffect transition="in" filter="fade">
-                                      <p:cBhvr>
-                                        <p:cTn id="20" dur="500"/>
-                                        <p:tgtEl>
-                                          <p:spTgt spid="4">
-                                            <p:txEl>
-                                              <p:pRg st="1" end="1"/>
-                                            </p:txEl>
-                                          </p:spTgt>
-                                        </p:tgtEl>
-                                      </p:cBhvr>
-                                    </p:animEffect>
-                                  </p:childTnLst>
-                                </p:cTn>
-                              </p:par>
-                            </p:childTnLst>
-                          </p:cTn>
-                        </p:par>
-                      </p:childTnLst>
-                    </p:cTn>
-                  </p:par>
-                  <p:par>
-                    <p:cTn id="21" fill="hold">
-                      <p:stCondLst>
-                        <p:cond delay="indefinite"/>
-                      </p:stCondLst>
-                      <p:childTnLst>
-                        <p:par>
-                          <p:cTn id="22" fill="hold">
-                            <p:stCondLst>
-                              <p:cond delay="0"/>
-                            </p:stCondLst>
-                            <p:childTnLst>
-                              <p:par>
-                                <p:cTn id="23" presetID="10" presetClass="entr" presetSubtype="0" fill="hold" grpId="0" nodeType="clickEffect">
-                                  <p:stCondLst>
-                                    <p:cond delay="0"/>
-                                  </p:stCondLst>
-                                  <p:childTnLst>
-                                    <p:set>
-                                      <p:cBhvr>
-                                        <p:cTn id="24" dur="1" fill="hold">
-                                          <p:stCondLst>
-                                            <p:cond delay="0"/>
-                                          </p:stCondLst>
-                                        </p:cTn>
-                                        <p:tgtEl>
-                                          <p:spTgt spid="13"/>
-                                        </p:tgtEl>
-                                        <p:attrNameLst>
-                                          <p:attrName>style.visibility</p:attrName>
-                                        </p:attrNameLst>
-                                      </p:cBhvr>
-                                      <p:to>
-                                        <p:strVal val="visible"/>
-                                      </p:to>
-                                    </p:set>
-                                    <p:animEffect transition="in" filter="fade">
-                                      <p:cBhvr>
-                                        <p:cTn id="25" dur="500"/>
-                                        <p:tgtEl>
-                                          <p:spTgt spid="13"/>
-                                        </p:tgtEl>
-                                      </p:cBhvr>
-                                    </p:animEffect>
-                                  </p:childTnLst>
-                                </p:cTn>
-                              </p:par>
-                              <p:par>
-                                <p:cTn id="26" presetID="10" presetClass="entr" presetSubtype="0" fill="hold" nodeType="withEffect">
-                                  <p:stCondLst>
-                                    <p:cond delay="0"/>
-                                  </p:stCondLst>
-                                  <p:childTnLst>
-                                    <p:set>
-                                      <p:cBhvr>
-                                        <p:cTn id="27" dur="1" fill="hold">
-                                          <p:stCondLst>
-                                            <p:cond delay="0"/>
-                                          </p:stCondLst>
-                                        </p:cTn>
-                                        <p:tgtEl>
-                                          <p:spTgt spid="15"/>
-                                        </p:tgtEl>
-                                        <p:attrNameLst>
-                                          <p:attrName>style.visibility</p:attrName>
-                                        </p:attrNameLst>
-                                      </p:cBhvr>
-                                      <p:to>
-                                        <p:strVal val="visible"/>
-                                      </p:to>
-                                    </p:set>
-                                    <p:animEffect transition="in" filter="fade">
-                                      <p:cBhvr>
-                                        <p:cTn id="28" dur="500"/>
-                                        <p:tgtEl>
-                                          <p:spTgt spid="15"/>
-                                        </p:tgtEl>
-                                      </p:cBhvr>
-                                    </p:animEffect>
-                                  </p:childTnLst>
-                                </p:cTn>
-                              </p:par>
-                            </p:childTnLst>
-                          </p:cTn>
-                        </p:par>
-                      </p:childTnLst>
-                    </p:cTn>
-                  </p:par>
-                  <p:par>
-                    <p:cTn id="29" fill="hold">
-                      <p:stCondLst>
-                        <p:cond delay="indefinite"/>
-                      </p:stCondLst>
-                      <p:childTnLst>
-                        <p:par>
-                          <p:cTn id="30" fill="hold">
-                            <p:stCondLst>
-                              <p:cond delay="0"/>
-                            </p:stCondLst>
-                            <p:childTnLst>
-                              <p:par>
-                                <p:cTn id="31" presetID="10" presetClass="entr" presetSubtype="0" fill="hold" grpId="0" nodeType="clickEffect">
-                                  <p:stCondLst>
-                                    <p:cond delay="0"/>
-                                  </p:stCondLst>
-                                  <p:childTnLst>
-                                    <p:set>
-                                      <p:cBhvr>
-                                        <p:cTn id="32" dur="1" fill="hold">
-                                          <p:stCondLst>
-                                            <p:cond delay="0"/>
-                                          </p:stCondLst>
-                                        </p:cTn>
-                                        <p:tgtEl>
-                                          <p:spTgt spid="14"/>
-                                        </p:tgtEl>
-                                        <p:attrNameLst>
-                                          <p:attrName>style.visibility</p:attrName>
-                                        </p:attrNameLst>
-                                      </p:cBhvr>
-                                      <p:to>
-                                        <p:strVal val="visible"/>
-                                      </p:to>
-                                    </p:set>
-                                    <p:animEffect transition="in" filter="fade">
-                                      <p:cBhvr>
-                                        <p:cTn id="33" dur="500"/>
-                                        <p:tgtEl>
-                                          <p:spTgt spid="14"/>
-                                        </p:tgtEl>
-                                      </p:cBhvr>
-                                    </p:animEffect>
-                                  </p:childTnLst>
-                                </p:cTn>
-                              </p:par>
-                              <p:par>
-                                <p:cTn id="34" presetID="10" presetClass="entr" presetSubtype="0" fill="hold" nodeType="withEffect">
-                                  <p:stCondLst>
-                                    <p:cond delay="0"/>
-                                  </p:stCondLst>
-                                  <p:childTnLst>
-                                    <p:set>
-                                      <p:cBhvr>
-                                        <p:cTn id="35" dur="1" fill="hold">
-                                          <p:stCondLst>
-                                            <p:cond delay="0"/>
-                                          </p:stCondLst>
-                                        </p:cTn>
-                                        <p:tgtEl>
-                                          <p:spTgt spid="18"/>
-                                        </p:tgtEl>
-                                        <p:attrNameLst>
-                                          <p:attrName>style.visibility</p:attrName>
-                                        </p:attrNameLst>
-                                      </p:cBhvr>
-                                      <p:to>
-                                        <p:strVal val="visible"/>
-                                      </p:to>
-                                    </p:set>
-                                    <p:animEffect transition="in" filter="fade">
-                                      <p:cBhvr>
-                                        <p:cTn id="36" dur="500"/>
-                                        <p:tgtEl>
-                                          <p:spTgt spid="18"/>
-                                        </p:tgtEl>
-                                      </p:cBhvr>
-                                    </p:animEffect>
-                                  </p:childTnLst>
-                                </p:cTn>
-                              </p:par>
-                            </p:childTnLst>
-                          </p:cTn>
-                        </p:par>
-                      </p:childTnLst>
-                    </p:cTn>
-                  </p:par>
-                  <p:par>
-                    <p:cTn id="37" fill="hold">
-                      <p:stCondLst>
-                        <p:cond delay="indefinite"/>
-                      </p:stCondLst>
-                      <p:childTnLst>
-                        <p:par>
-                          <p:cTn id="38" fill="hold">
-                            <p:stCondLst>
-                              <p:cond delay="0"/>
-                            </p:stCondLst>
-                            <p:childTnLst>
-                              <p:par>
-                                <p:cTn id="39" presetID="10" presetClass="entr" presetSubtype="0" fill="hold" grpId="0" nodeType="clickEffect">
-                                  <p:stCondLst>
-                                    <p:cond delay="0"/>
-                                  </p:stCondLst>
-                                  <p:childTnLst>
-                                    <p:set>
-                                      <p:cBhvr>
-                                        <p:cTn id="40" dur="1" fill="hold">
-                                          <p:stCondLst>
-                                            <p:cond delay="0"/>
-                                          </p:stCondLst>
-                                        </p:cTn>
-                                        <p:tgtEl>
-                                          <p:spTgt spid="7"/>
-                                        </p:tgtEl>
-                                        <p:attrNameLst>
-                                          <p:attrName>style.visibility</p:attrName>
-                                        </p:attrNameLst>
-                                      </p:cBhvr>
-                                      <p:to>
-                                        <p:strVal val="visible"/>
-                                      </p:to>
-                                    </p:set>
-                                    <p:animEffect transition="in" filter="fade">
-                                      <p:cBhvr>
-                                        <p:cTn id="41" dur="500"/>
-                                        <p:tgtEl>
-                                          <p:spTgt spid="7"/>
-                                        </p:tgtEl>
-                                      </p:cBhvr>
-                                    </p:animEffect>
-                                  </p:childTnLst>
-                                </p:cTn>
-                              </p:par>
-                              <p:par>
-                                <p:cTn id="42" presetID="10" presetClass="entr" presetSubtype="0" fill="hold" nodeType="withEffect">
-                                  <p:stCondLst>
-                                    <p:cond delay="0"/>
-                                  </p:stCondLst>
-                                  <p:childTnLst>
-                                    <p:set>
-                                      <p:cBhvr>
-                                        <p:cTn id="43" dur="1" fill="hold">
-                                          <p:stCondLst>
-                                            <p:cond delay="0"/>
-                                          </p:stCondLst>
-                                        </p:cTn>
-                                        <p:tgtEl>
-                                          <p:spTgt spid="9"/>
-                                        </p:tgtEl>
-                                        <p:attrNameLst>
-                                          <p:attrName>style.visibility</p:attrName>
-                                        </p:attrNameLst>
-                                      </p:cBhvr>
-                                      <p:to>
-                                        <p:strVal val="visible"/>
-                                      </p:to>
-                                    </p:set>
-                                    <p:animEffect transition="in" filter="fade">
-                                      <p:cBhvr>
-                                        <p:cTn id="44" dur="500"/>
-                                        <p:tgtEl>
-                                          <p:spTgt spid="9"/>
-                                        </p:tgtEl>
-                                      </p:cBhvr>
-                                    </p:animEffect>
-                                  </p:childTnLst>
-                                </p:cTn>
-                              </p:par>
-                            </p:childTnLst>
-                          </p:cTn>
-                        </p:par>
-                      </p:childTnLst>
-                    </p:cTn>
-                  </p:par>
-                  <p:par>
-                    <p:cTn id="45" fill="hold">
-                      <p:stCondLst>
-                        <p:cond delay="indefinite"/>
-                      </p:stCondLst>
-                      <p:childTnLst>
-                        <p:par>
-                          <p:cTn id="46" fill="hold">
-                            <p:stCondLst>
-                              <p:cond delay="0"/>
-                            </p:stCondLst>
-                            <p:childTnLst>
-                              <p:par>
-                                <p:cTn id="47" presetID="10" presetClass="entr" presetSubtype="0" fill="hold" nodeType="clickEffect">
-                                  <p:stCondLst>
-                                    <p:cond delay="0"/>
-                                  </p:stCondLst>
-                                  <p:childTnLst>
-                                    <p:set>
-                                      <p:cBhvr>
-                                        <p:cTn id="48" dur="1" fill="hold">
-                                          <p:stCondLst>
-                                            <p:cond delay="0"/>
-                                          </p:stCondLst>
-                                        </p:cTn>
-                                        <p:tgtEl>
-                                          <p:spTgt spid="4">
-                                            <p:txEl>
-                                              <p:pRg st="2" end="2"/>
-                                            </p:txEl>
-                                          </p:spTgt>
-                                        </p:tgtEl>
-                                        <p:attrNameLst>
-                                          <p:attrName>style.visibility</p:attrName>
-                                        </p:attrNameLst>
-                                      </p:cBhvr>
-                                      <p:to>
-                                        <p:strVal val="visible"/>
-                                      </p:to>
-                                    </p:set>
-                                    <p:animEffect transition="in" filter="fade">
-                                      <p:cBhvr>
-                                        <p:cTn id="49" dur="500"/>
-                                        <p:tgtEl>
-                                          <p:spTgt spid="4">
-                                            <p:txEl>
-                                              <p:pRg st="2" end="2"/>
-                                            </p:txEl>
-                                          </p:spTgt>
-                                        </p:tgtEl>
-                                      </p:cBhvr>
-                                    </p:animEffect>
-                                  </p:childTnLst>
-                                </p:cTn>
-                              </p:par>
-                            </p:childTnLst>
-                          </p:cTn>
-                        </p:par>
-                      </p:childTnLst>
-                    </p:cTn>
-                  </p:par>
-                  <p:par>
-                    <p:cTn id="50" fill="hold">
-                      <p:stCondLst>
-                        <p:cond delay="indefinite"/>
-                      </p:stCondLst>
-                      <p:childTnLst>
-                        <p:par>
-                          <p:cTn id="51" fill="hold">
-                            <p:stCondLst>
-                              <p:cond delay="0"/>
-                            </p:stCondLst>
-                            <p:childTnLst>
-                              <p:par>
-                                <p:cTn id="52" presetID="10" presetClass="entr" presetSubtype="0" fill="hold" nodeType="clickEffect">
-                                  <p:stCondLst>
-                                    <p:cond delay="0"/>
-                                  </p:stCondLst>
-                                  <p:childTnLst>
-                                    <p:set>
-                                      <p:cBhvr>
-                                        <p:cTn id="53" dur="1" fill="hold">
-                                          <p:stCondLst>
-                                            <p:cond delay="0"/>
-                                          </p:stCondLst>
-                                        </p:cTn>
-                                        <p:tgtEl>
-                                          <p:spTgt spid="4">
-                                            <p:txEl>
-                                              <p:pRg st="3" end="3"/>
-                                            </p:txEl>
-                                          </p:spTgt>
-                                        </p:tgtEl>
-                                        <p:attrNameLst>
-                                          <p:attrName>style.visibility</p:attrName>
-                                        </p:attrNameLst>
-                                      </p:cBhvr>
-                                      <p:to>
-                                        <p:strVal val="visible"/>
-                                      </p:to>
-                                    </p:set>
-                                    <p:animEffect transition="in" filter="fade">
-                                      <p:cBhvr>
-                                        <p:cTn id="54" dur="500"/>
-                                        <p:tgtEl>
-                                          <p:spTgt spid="4">
-                                            <p:txEl>
-                                              <p:pRg st="3" end="3"/>
-                                            </p:txEl>
-                                          </p:spTgt>
-                                        </p:tgtEl>
-                                      </p:cBhvr>
-                                    </p:animEffect>
-                                  </p:childTnLst>
-                                </p:cTn>
-                              </p:par>
-                            </p:childTnLst>
-                          </p:cTn>
-                        </p:par>
-                      </p:childTnLst>
-                    </p:cTn>
-                  </p:par>
-                </p:childTnLst>
-              </p:cTn>
-              <p:prevCondLst>
-                <p:cond evt="onPrev" delay="0">
-                  <p:tgtEl>
-                    <p:sldTgt/>
-                  </p:tgtEl>
-                </p:cond>
-              </p:prevCondLst>
-              <p:nextCondLst>
-                <p:cond evt="onNext" delay="0">
-                  <p:tgtEl>
-                    <p:sldTgt/>
-                  </p:tgtEl>
-                </p:cond>
-              </p:nextCondLst>
-            </p:seq>
-          </p:childTnLst>
-        </p:cTn>
-      </p:par>
-    </p:tnLst>
-    <p:bldLst>
-      <p:bldP spid="6" grpId="0" animBg="1"/>
-      <p:bldP spid="7" grpId="0"/>
-      <p:bldP spid="13" grpId="0"/>
-      <p:bldP spid="14" grpId="0"/>
-    </p:bldLst>
   </p:timing>
 </p:sld>
 </file>

</xml_diff>